<commit_message>
NMDA & GABA figs & other updates
</commit_message>
<xml_diff>
--- a/docs/brainpy_handbook/ppt/rnns.pptx
+++ b/docs/brainpy_handbook/ppt/rnns.pptx
@@ -6804,14 +6804,7 @@
                         <a:latin typeface="Cambria Math" panose="02040503050406030204" pitchFamily="18" charset="0"/>
                         <a:cs typeface="Cambria Math" panose="02040503050406030204" pitchFamily="18" charset="0"/>
                       </a:rPr>
-                      <m:t>∈[</m:t>
-                    </m:r>
-                    <m:r>
-                      <a:rPr lang="en-US" altLang="zh-CN" i="1" dirty="0">
-                        <a:latin typeface="Cambria Math" panose="02040503050406030204" pitchFamily="18" charset="0"/>
-                        <a:cs typeface="Cambria Math" panose="02040503050406030204" pitchFamily="18" charset="0"/>
-                      </a:rPr>
-                      <m:t>−</m:t>
+                      <m:t>∈[−</m:t>
                     </m:r>
                     <m:r>
                       <a:rPr lang="en-US" altLang="zh-CN" i="1" dirty="0">
@@ -6942,7 +6935,21 @@
                         <a:latin typeface="Cambria Math" panose="02040503050406030204" pitchFamily="18" charset="0"/>
                         <a:cs typeface="Cambria Math" panose="02040503050406030204" pitchFamily="18" charset="0"/>
                       </a:rPr>
-                      <m:t>𝑥−𝑥</m:t>
+                      <m:t>𝑥</m:t>
+                    </m:r>
+                    <m:r>
+                      <a:rPr lang="en-US" altLang="zh-CN" i="1" dirty="0">
+                        <a:latin typeface="Cambria Math" panose="02040503050406030204" pitchFamily="18" charset="0"/>
+                        <a:cs typeface="Cambria Math" panose="02040503050406030204" pitchFamily="18" charset="0"/>
+                      </a:rPr>
+                      <m:t>−</m:t>
+                    </m:r>
+                    <m:r>
+                      <a:rPr lang="en-US" altLang="zh-CN" i="1" dirty="0">
+                        <a:latin typeface="Cambria Math" panose="02040503050406030204" pitchFamily="18" charset="0"/>
+                        <a:cs typeface="Cambria Math" panose="02040503050406030204" pitchFamily="18" charset="0"/>
+                      </a:rPr>
+                      <m:t>𝑥</m:t>
                     </m:r>
                     <m:r>
                       <a:rPr lang="en-US" altLang="zh-CN" i="1" dirty="0">
@@ -6957,13 +6964,6 @@
                         <a:cs typeface="Cambria Math" panose="02040503050406030204" pitchFamily="18" charset="0"/>
                       </a:rPr>
                       <m:t>𝜋</m:t>
-                    </m:r>
-                    <m:r>
-                      <a:rPr lang="en-US" altLang="zh-CN" i="1" dirty="0">
-                        <a:latin typeface="Cambria Math" panose="02040503050406030204" pitchFamily="18" charset="0"/>
-                        <a:cs typeface="Cambria Math" panose="02040503050406030204" pitchFamily="18" charset="0"/>
-                      </a:rPr>
-                      <m:t/>
                     </m:r>
                   </m:oMath>
                 </a14:m>
@@ -7412,14 +7412,7 @@
                               <a:latin typeface="Cambria Math" panose="02040503050406030204" pitchFamily="18" charset="0"/>
                               <a:cs typeface="Cambria Math" panose="02040503050406030204" pitchFamily="18" charset="0"/>
                             </a:rPr>
-                            <m:t>𝑑</m:t>
-                          </m:r>
-                          <m:r>
-                            <a:rPr lang="en-US" altLang="zh-CN" sz="2000" i="1">
-                              <a:latin typeface="Cambria Math" panose="02040503050406030204" pitchFamily="18" charset="0"/>
-                              <a:cs typeface="Cambria Math" panose="02040503050406030204" pitchFamily="18" charset="0"/>
-                            </a:rPr>
-                            <m:t>𝑢</m:t>
+                            <m:t>𝑑𝑢</m:t>
                           </m:r>
                           <m:r>
                             <a:rPr lang="en-US" altLang="zh-CN" sz="2000" i="1">
@@ -7472,14 +7465,14 @@
                           <a:latin typeface="Cambria Math" panose="02040503050406030204" pitchFamily="18" charset="0"/>
                           <a:cs typeface="Cambria Math" panose="02040503050406030204" pitchFamily="18" charset="0"/>
                         </a:rPr>
-                        <m:t>=</m:t>
+                        <m:t>=−</m:t>
                       </m:r>
                       <m:r>
                         <a:rPr lang="en-US" altLang="zh-CN" sz="2000" i="1">
                           <a:latin typeface="Cambria Math" panose="02040503050406030204" pitchFamily="18" charset="0"/>
                           <a:cs typeface="Cambria Math" panose="02040503050406030204" pitchFamily="18" charset="0"/>
                         </a:rPr>
-                        <m:t>−𝑢</m:t>
+                        <m:t>𝑢</m:t>
                       </m:r>
                       <m:r>
                         <a:rPr lang="en-US" altLang="zh-CN" sz="2000" i="1">
@@ -7705,6 +7698,323 @@
                 <a:blip r:embed="rId6"/>
                 <a:stretch>
                   <a:fillRect l="-9" t="-28" r="9" b="28"/>
+                </a:stretch>
+              </a:blipFill>
+            </p:spPr>
+            <p:txBody>
+              <a:bodyPr/>
+              <a:lstStyle/>
+              <a:p>
+                <a:r>
+                  <a:rPr lang="zh-CN" altLang="en-US">
+                    <a:noFill/>
+                  </a:rPr>
+                  <a:t> </a:t>
+                </a:r>
+              </a:p>
+            </p:txBody>
+          </p:sp>
+        </mc:Fallback>
+      </mc:AlternateContent>
+      <p:sp>
+        <p:nvSpPr>
+          <p:cNvPr id="15" name="右大括号 14"/>
+          <p:cNvSpPr/>
+          <p:nvPr/>
+        </p:nvSpPr>
+        <p:spPr>
+          <a:xfrm>
+            <a:off x="10113645" y="11045825"/>
+            <a:ext cx="216000" cy="648000"/>
+          </a:xfrm>
+          <a:prstGeom prst="rightBrace">
+            <a:avLst/>
+          </a:prstGeom>
+        </p:spPr>
+        <p:style>
+          <a:lnRef idx="1">
+            <a:schemeClr val="dk1"/>
+          </a:lnRef>
+          <a:fillRef idx="0">
+            <a:schemeClr val="dk1"/>
+          </a:fillRef>
+          <a:effectRef idx="0">
+            <a:schemeClr val="dk1"/>
+          </a:effectRef>
+          <a:fontRef idx="minor">
+            <a:schemeClr val="tx1"/>
+          </a:fontRef>
+        </p:style>
+        <p:txBody>
+          <a:bodyPr rtlCol="0" anchor="ctr"/>
+          <a:p>
+            <a:pPr algn="ctr"/>
+            <a:endParaRPr lang="zh-CN" altLang="en-US"/>
+          </a:p>
+        </p:txBody>
+      </p:sp>
+      <mc:AlternateContent xmlns:mc="http://schemas.openxmlformats.org/markup-compatibility/2006">
+        <mc:Choice xmlns:a14="http://schemas.microsoft.com/office/drawing/2010/main" Requires="a14">
+          <p:sp>
+            <p:nvSpPr>
+              <p:cNvPr id="16" name="文本框 15"/>
+              <p:cNvSpPr txBox="1"/>
+              <p:nvPr/>
+            </p:nvSpPr>
+            <p:spPr>
+              <a:xfrm>
+                <a:off x="10481881" y="11024806"/>
+                <a:ext cx="2771140" cy="658495"/>
+              </a:xfrm>
+              <a:prstGeom prst="rect">
+                <a:avLst/>
+              </a:prstGeom>
+              <a:noFill/>
+            </p:spPr>
+            <p:txBody>
+              <a:bodyPr wrap="none" rtlCol="0" anchor="t">
+                <a:spAutoFit/>
+              </a:bodyPr>
+              <a:p>
+                <a:pPr algn="l"/>
+                <a14:m>
+                  <m:oMathPara xmlns:m="http://schemas.openxmlformats.org/officeDocument/2006/math">
+                    <m:oMathParaPr>
+                      <m:jc m:val="centerGroup"/>
+                    </m:oMathParaPr>
+                    <m:oMath xmlns:m="http://schemas.openxmlformats.org/officeDocument/2006/math">
+                      <m:sSub>
+                        <m:sSubPr>
+                          <m:ctrlPr>
+                            <a:rPr lang="en-US" altLang="zh-CN" i="1">
+                              <a:latin typeface="Cambria Math" panose="02040503050406030204" pitchFamily="18" charset="0"/>
+                              <a:cs typeface="Cambria Math" panose="02040503050406030204" pitchFamily="18" charset="0"/>
+                            </a:rPr>
+                          </m:ctrlPr>
+                        </m:sSubPr>
+                        <m:e>
+                          <m:r>
+                            <a:rPr lang="en-US" altLang="zh-CN" i="1">
+                              <a:latin typeface="Cambria Math" panose="02040503050406030204" pitchFamily="18" charset="0"/>
+                              <a:cs typeface="Cambria Math" panose="02040503050406030204" pitchFamily="18" charset="0"/>
+                            </a:rPr>
+                            <m:t>𝐼</m:t>
+                          </m:r>
+                        </m:e>
+                        <m:sub>
+                          <m:r>
+                            <a:rPr lang="en-US" altLang="zh-CN" i="1">
+                              <a:latin typeface="Cambria Math" panose="02040503050406030204" pitchFamily="18" charset="0"/>
+                              <a:cs typeface="Cambria Math" panose="02040503050406030204" pitchFamily="18" charset="0"/>
+                            </a:rPr>
+                            <m:t>𝑒𝑥𝑡</m:t>
+                          </m:r>
+                        </m:sub>
+                      </m:sSub>
+                      <m:r>
+                        <a:rPr lang="en-US" altLang="zh-CN" i="1">
+                          <a:latin typeface="Cambria Math" panose="02040503050406030204" pitchFamily="18" charset="0"/>
+                          <a:cs typeface="Cambria Math" panose="02040503050406030204" pitchFamily="18" charset="0"/>
+                        </a:rPr>
+                        <m:t>=</m:t>
+                      </m:r>
+                      <m:r>
+                        <a:rPr lang="en-US" altLang="zh-CN" i="1">
+                          <a:latin typeface="Cambria Math" panose="02040503050406030204" pitchFamily="18" charset="0"/>
+                          <a:cs typeface="Cambria Math" panose="02040503050406030204" pitchFamily="18" charset="0"/>
+                        </a:rPr>
+                        <m:t>𝐴</m:t>
+                      </m:r>
+                      <m:r>
+                        <a:rPr lang="en-US" altLang="zh-CN" i="1">
+                          <a:latin typeface="Cambria Math" panose="02040503050406030204" pitchFamily="18" charset="0"/>
+                          <a:cs typeface="Cambria Math" panose="02040503050406030204" pitchFamily="18" charset="0"/>
+                        </a:rPr>
+                        <m:t> </m:t>
+                      </m:r>
+                      <m:r>
+                        <a:rPr lang="en-US" altLang="zh-CN" i="1">
+                          <a:latin typeface="Cambria Math" panose="02040503050406030204" pitchFamily="18" charset="0"/>
+                          <a:cs typeface="Cambria Math" panose="02040503050406030204" pitchFamily="18" charset="0"/>
+                        </a:rPr>
+                        <m:t>𝑒𝑥𝑝</m:t>
+                      </m:r>
+                      <m:r>
+                        <a:rPr lang="en-US" altLang="zh-CN" i="1">
+                          <a:latin typeface="Cambria Math" panose="02040503050406030204" pitchFamily="18" charset="0"/>
+                          <a:cs typeface="Cambria Math" panose="02040503050406030204" pitchFamily="18" charset="0"/>
+                        </a:rPr>
+                        <m:t>(</m:t>
+                      </m:r>
+                      <m:f>
+                        <m:fPr>
+                          <m:ctrlPr>
+                            <a:rPr lang="en-US" altLang="zh-CN" i="1">
+                              <a:latin typeface="Cambria Math" panose="02040503050406030204" pitchFamily="18" charset="0"/>
+                              <a:cs typeface="Cambria Math" panose="02040503050406030204" pitchFamily="18" charset="0"/>
+                            </a:rPr>
+                          </m:ctrlPr>
+                        </m:fPr>
+                        <m:num>
+                          <m:r>
+                            <a:rPr lang="en-US" altLang="zh-CN" i="1">
+                              <a:latin typeface="Cambria Math" panose="02040503050406030204" pitchFamily="18" charset="0"/>
+                              <a:cs typeface="Cambria Math" panose="02040503050406030204" pitchFamily="18" charset="0"/>
+                            </a:rPr>
+                            <m:t>|</m:t>
+                          </m:r>
+                          <m:r>
+                            <a:rPr lang="en-US" altLang="zh-CN" i="1">
+                              <a:latin typeface="Cambria Math" panose="02040503050406030204" pitchFamily="18" charset="0"/>
+                              <a:cs typeface="Cambria Math" panose="02040503050406030204" pitchFamily="18" charset="0"/>
+                            </a:rPr>
+                            <m:t>𝑥</m:t>
+                          </m:r>
+                          <m:r>
+                            <a:rPr lang="en-US" altLang="zh-CN" i="1">
+                              <a:latin typeface="Cambria Math" panose="02040503050406030204" pitchFamily="18" charset="0"/>
+                              <a:cs typeface="Cambria Math" panose="02040503050406030204" pitchFamily="18" charset="0"/>
+                            </a:rPr>
+                            <m:t>−</m:t>
+                          </m:r>
+                          <m:r>
+                            <a:rPr lang="en-US" altLang="zh-CN" i="1">
+                              <a:latin typeface="Cambria Math" panose="02040503050406030204" pitchFamily="18" charset="0"/>
+                              <a:cs typeface="Cambria Math" panose="02040503050406030204" pitchFamily="18" charset="0"/>
+                            </a:rPr>
+                            <m:t>𝑧</m:t>
+                          </m:r>
+                          <m:r>
+                            <a:rPr lang="en-US" altLang="zh-CN" i="1">
+                              <a:latin typeface="Cambria Math" panose="02040503050406030204" pitchFamily="18" charset="0"/>
+                              <a:cs typeface="Cambria Math" panose="02040503050406030204" pitchFamily="18" charset="0"/>
+                            </a:rPr>
+                            <m:t>(</m:t>
+                          </m:r>
+                          <m:r>
+                            <a:rPr lang="en-US" altLang="zh-CN" i="1">
+                              <a:latin typeface="Cambria Math" panose="02040503050406030204" pitchFamily="18" charset="0"/>
+                              <a:cs typeface="Cambria Math" panose="02040503050406030204" pitchFamily="18" charset="0"/>
+                            </a:rPr>
+                            <m:t>𝑡</m:t>
+                          </m:r>
+                          <m:r>
+                            <a:rPr lang="en-US" altLang="zh-CN" i="1">
+                              <a:latin typeface="Cambria Math" panose="02040503050406030204" pitchFamily="18" charset="0"/>
+                              <a:cs typeface="Cambria Math" panose="02040503050406030204" pitchFamily="18" charset="0"/>
+                            </a:rPr>
+                            <m:t>)</m:t>
+                          </m:r>
+                          <m:sSup>
+                            <m:sSupPr>
+                              <m:ctrlPr>
+                                <a:rPr lang="en-US" altLang="zh-CN" i="1">
+                                  <a:latin typeface="Cambria Math" panose="02040503050406030204" pitchFamily="18" charset="0"/>
+                                  <a:cs typeface="Cambria Math" panose="02040503050406030204" pitchFamily="18" charset="0"/>
+                                </a:rPr>
+                              </m:ctrlPr>
+                            </m:sSupPr>
+                            <m:e>
+                              <m:r>
+                                <a:rPr lang="en-US" altLang="zh-CN" i="1">
+                                  <a:latin typeface="Cambria Math" panose="02040503050406030204" pitchFamily="18" charset="0"/>
+                                  <a:cs typeface="Cambria Math" panose="02040503050406030204" pitchFamily="18" charset="0"/>
+                                </a:rPr>
+                                <m:t>|</m:t>
+                              </m:r>
+                            </m:e>
+                            <m:sup>
+                              <m:r>
+                                <a:rPr lang="en-US" altLang="zh-CN" i="1">
+                                  <a:latin typeface="Cambria Math" panose="02040503050406030204" pitchFamily="18" charset="0"/>
+                                  <a:cs typeface="Cambria Math" panose="02040503050406030204" pitchFamily="18" charset="0"/>
+                                </a:rPr>
+                                <m:t>2</m:t>
+                              </m:r>
+                            </m:sup>
+                          </m:sSup>
+                          <m:r>
+                            <a:rPr lang="en-US" altLang="zh-CN" i="1">
+                              <a:latin typeface="Cambria Math" panose="02040503050406030204" pitchFamily="18" charset="0"/>
+                              <a:cs typeface="Cambria Math" panose="02040503050406030204" pitchFamily="18" charset="0"/>
+                            </a:rPr>
+                            <m:t>)</m:t>
+                          </m:r>
+                        </m:num>
+                        <m:den>
+                          <m:r>
+                            <a:rPr lang="en-US" altLang="zh-CN" i="1">
+                              <a:latin typeface="Cambria Math" panose="02040503050406030204" pitchFamily="18" charset="0"/>
+                              <a:cs typeface="Cambria Math" panose="02040503050406030204" pitchFamily="18" charset="0"/>
+                            </a:rPr>
+                            <m:t>4</m:t>
+                          </m:r>
+                          <m:sSup>
+                            <m:sSupPr>
+                              <m:ctrlPr>
+                                <a:rPr lang="en-US" altLang="zh-CN" i="1">
+                                  <a:latin typeface="Cambria Math" panose="02040503050406030204" pitchFamily="18" charset="0"/>
+                                  <a:cs typeface="Cambria Math" panose="02040503050406030204" pitchFamily="18" charset="0"/>
+                                </a:rPr>
+                              </m:ctrlPr>
+                            </m:sSupPr>
+                            <m:e>
+                              <m:r>
+                                <a:rPr lang="en-US" altLang="zh-CN" i="1">
+                                  <a:latin typeface="Cambria Math" panose="02040503050406030204" pitchFamily="18" charset="0"/>
+                                  <a:cs typeface="Cambria Math" panose="02040503050406030204" pitchFamily="18" charset="0"/>
+                                </a:rPr>
+                                <m:t>𝑎</m:t>
+                              </m:r>
+                            </m:e>
+                            <m:sup>
+                              <m:r>
+                                <a:rPr lang="en-US" altLang="zh-CN" i="1">
+                                  <a:latin typeface="Cambria Math" panose="02040503050406030204" pitchFamily="18" charset="0"/>
+                                  <a:cs typeface="Cambria Math" panose="02040503050406030204" pitchFamily="18" charset="0"/>
+                                </a:rPr>
+                                <m:t>2</m:t>
+                              </m:r>
+                            </m:sup>
+                          </m:sSup>
+                        </m:den>
+                      </m:f>
+                      <m:r>
+                        <a:rPr lang="en-US" altLang="zh-CN" i="1">
+                          <a:latin typeface="Cambria Math" panose="02040503050406030204" pitchFamily="18" charset="0"/>
+                          <a:cs typeface="Cambria Math" panose="02040503050406030204" pitchFamily="18" charset="0"/>
+                        </a:rPr>
+                        <m:t>)</m:t>
+                      </m:r>
+                    </m:oMath>
+                  </m:oMathPara>
+                </a14:m>
+                <a:endParaRPr lang="zh-CN" altLang="en-US"/>
+              </a:p>
+            </p:txBody>
+          </p:sp>
+        </mc:Choice>
+        <mc:Fallback>
+          <p:sp>
+            <p:nvSpPr>
+              <p:cNvPr id="16" name="文本框 15"/>
+              <p:cNvSpPr txBox="1">
+                <a:spLocks noRot="1" noChangeAspect="1" noMove="1" noResize="1" noEditPoints="1" noAdjustHandles="1" noChangeArrowheads="1" noChangeShapeType="1" noTextEdit="1"/>
+              </p:cNvSpPr>
+              <p:nvPr/>
+            </p:nvSpPr>
+            <p:spPr>
+              <a:xfrm>
+                <a:off x="10481881" y="11024806"/>
+                <a:ext cx="2771140" cy="658495"/>
+              </a:xfrm>
+              <a:prstGeom prst="rect">
+                <a:avLst/>
+              </a:prstGeom>
+              <a:blipFill rotWithShape="1">
+                <a:blip r:embed="rId7"/>
+                <a:stretch>
+                  <a:fillRect l="-21" t="-87" r="21" b="87"/>
                 </a:stretch>
               </a:blipFill>
             </p:spPr>

</xml_diff>

<commit_message>
update ppt (code description - zh)
</commit_message>
<xml_diff>
--- a/docs/brainpy_handbook/ppt/rnns.pptx
+++ b/docs/brainpy_handbook/ppt/rnns.pptx
@@ -3370,7 +3370,7 @@
       </p:sp>
       <p:pic>
         <p:nvPicPr>
-          <p:cNvPr id="6" name="图片 5" descr="/Users/mac/Documents/github/BrainPy-Models/docs/brainpy_handbook/ppt/figs/nets/decision01.pngdecision01"/>
+          <p:cNvPr id="6" name="图片 5" descr="/Users/mac/Desktop/decision1.pngdecision1"/>
           <p:cNvPicPr>
             <a:picLocks noChangeAspect="1"/>
           </p:cNvPicPr>
@@ -3385,8 +3385,8 @@
         </p:blipFill>
         <p:spPr>
           <a:xfrm>
-            <a:off x="0" y="1820250"/>
-            <a:ext cx="10680826" cy="7569200"/>
+            <a:off x="-14859" y="1388450"/>
+            <a:ext cx="10129722" cy="8257286"/>
           </a:xfrm>
           <a:prstGeom prst="rect">
             <a:avLst/>
@@ -3401,7 +3401,7 @@
         </p:nvSpPr>
         <p:spPr>
           <a:xfrm>
-            <a:off x="5205730" y="5528945"/>
+            <a:off x="4842510" y="5780405"/>
             <a:ext cx="216000" cy="540000"/>
           </a:xfrm>
           <a:prstGeom prst="rightBrace">
@@ -3439,7 +3439,7 @@
         </p:nvSpPr>
         <p:spPr>
           <a:xfrm>
-            <a:off x="9792335" y="6546850"/>
+            <a:off x="9429115" y="6770370"/>
             <a:ext cx="216000" cy="900000"/>
           </a:xfrm>
           <a:prstGeom prst="rightBrace">
@@ -3476,7 +3476,7 @@
         </p:nvSpPr>
         <p:spPr>
           <a:xfrm>
-            <a:off x="9799320" y="8002905"/>
+            <a:off x="9436100" y="8226425"/>
             <a:ext cx="216000" cy="900000"/>
           </a:xfrm>
           <a:prstGeom prst="rightBrace">
@@ -3515,7 +3515,7 @@
             </p:nvSpPr>
             <p:spPr>
               <a:xfrm>
-                <a:off x="5667311" y="5418391"/>
+                <a:off x="5304091" y="5669851"/>
                 <a:ext cx="2184400" cy="739775"/>
               </a:xfrm>
               <a:prstGeom prst="rect">
@@ -3819,7 +3819,7 @@
             </p:nvSpPr>
             <p:spPr>
               <a:xfrm>
-                <a:off x="5667311" y="5418391"/>
+                <a:off x="5304091" y="5669851"/>
                 <a:ext cx="2184400" cy="739775"/>
               </a:xfrm>
               <a:prstGeom prst="rect">
@@ -3857,7 +3857,7 @@
             </p:nvSpPr>
             <p:spPr>
               <a:xfrm>
-                <a:off x="10205656" y="6034341"/>
+                <a:off x="9842436" y="6257861"/>
                 <a:ext cx="3364230" cy="1445895"/>
               </a:xfrm>
               <a:prstGeom prst="rect">
@@ -4583,7 +4583,7 @@
             </p:nvSpPr>
             <p:spPr>
               <a:xfrm>
-                <a:off x="10205656" y="6034341"/>
+                <a:off x="9842436" y="6257861"/>
                 <a:ext cx="3364230" cy="1445895"/>
               </a:xfrm>
               <a:prstGeom prst="rect">
@@ -4621,7 +4621,7 @@
             </p:nvSpPr>
             <p:spPr>
               <a:xfrm>
-                <a:off x="10265346" y="7892351"/>
+                <a:off x="9902126" y="8115871"/>
                 <a:ext cx="3364230" cy="1445895"/>
               </a:xfrm>
               <a:prstGeom prst="rect">
@@ -5347,7 +5347,7 @@
             </p:nvSpPr>
             <p:spPr>
               <a:xfrm>
-                <a:off x="10265346" y="7892351"/>
+                <a:off x="9902126" y="8115871"/>
                 <a:ext cx="3364230" cy="1445895"/>
               </a:xfrm>
               <a:prstGeom prst="rect">
@@ -5405,7 +5405,7 @@
       </p:grpSpPr>
       <p:pic>
         <p:nvPicPr>
-          <p:cNvPr id="2" name="图片 1" descr="/Users/mac/Documents/github/BrainPy-Models/docs/brainpy_handbook/ppt/figs/nets/decision02.pngdecision02"/>
+          <p:cNvPr id="2" name="图片 1" descr="/Users/mac/Desktop/decision2.pngdecision2"/>
           <p:cNvPicPr>
             <a:picLocks noChangeAspect="1"/>
           </p:cNvPicPr>
@@ -5420,8 +5420,8 @@
         </p:blipFill>
         <p:spPr>
           <a:xfrm>
-            <a:off x="-254" y="2263480"/>
-            <a:ext cx="10692774" cy="11226800"/>
+            <a:off x="68" y="2263480"/>
+            <a:ext cx="10145552" cy="10954766"/>
           </a:xfrm>
           <a:prstGeom prst="rect">
             <a:avLst/>
@@ -5472,43 +5472,6 @@
               <a:t>Decision</a:t>
             </a:r>
             <a:endParaRPr lang="zh-CN" altLang="en-US" dirty="0"/>
-          </a:p>
-        </p:txBody>
-      </p:sp>
-      <p:sp>
-        <p:nvSpPr>
-          <p:cNvPr id="5" name="右大括号 4"/>
-          <p:cNvSpPr/>
-          <p:nvPr/>
-        </p:nvSpPr>
-        <p:spPr>
-          <a:xfrm>
-            <a:off x="10245725" y="8599170"/>
-            <a:ext cx="216000" cy="612000"/>
-          </a:xfrm>
-          <a:prstGeom prst="rightBrace">
-            <a:avLst/>
-          </a:prstGeom>
-        </p:spPr>
-        <p:style>
-          <a:lnRef idx="1">
-            <a:schemeClr val="dk1"/>
-          </a:lnRef>
-          <a:fillRef idx="0">
-            <a:schemeClr val="dk1"/>
-          </a:fillRef>
-          <a:effectRef idx="0">
-            <a:schemeClr val="dk1"/>
-          </a:effectRef>
-          <a:fontRef idx="minor">
-            <a:schemeClr val="tx1"/>
-          </a:fontRef>
-        </p:style>
-        <p:txBody>
-          <a:bodyPr rtlCol="0" anchor="ctr"/>
-          <a:p>
-            <a:pPr algn="ctr"/>
-            <a:endParaRPr lang="zh-CN" altLang="en-US"/>
           </a:p>
         </p:txBody>
       </p:sp>
@@ -5586,7 +5549,7 @@
       </p:sp>
       <p:pic>
         <p:nvPicPr>
-          <p:cNvPr id="6" name="图片 5" descr="/Users/mac/Documents/github/BrainPy-Models/docs/brainpy_handbook/figs/codes/decision_run.pngdecision_run"/>
+          <p:cNvPr id="6" name="图片 5" descr="/Users/mac/Desktop/decision3.pngdecision3"/>
           <p:cNvPicPr>
             <a:picLocks noChangeAspect="1"/>
           </p:cNvPicPr>
@@ -5601,8 +5564,8 @@
         </p:blipFill>
         <p:spPr>
           <a:xfrm>
-            <a:off x="0" y="2649242"/>
-            <a:ext cx="10680827" cy="5911215"/>
+            <a:off x="-1207" y="2596537"/>
+            <a:ext cx="10160964" cy="6039358"/>
           </a:xfrm>
           <a:prstGeom prst="rect">
             <a:avLst/>
@@ -5716,8 +5679,8 @@
         </p:nvSpPr>
         <p:spPr>
           <a:xfrm>
-            <a:off x="10934065" y="5528945"/>
-            <a:ext cx="2612390" cy="398780"/>
+            <a:off x="10934065" y="5420995"/>
+            <a:ext cx="2612390" cy="706755"/>
           </a:xfrm>
           <a:prstGeom prst="rect">
             <a:avLst/>
@@ -5731,7 +5694,7 @@
           <a:p>
             <a:r>
               <a:rPr lang="en-US" altLang="zh-CN" sz="2000" dirty="0"/>
-              <a:t>Specify parameters.</a:t>
+              <a:t>Specify values of the parameters.</a:t>
             </a:r>
             <a:endParaRPr lang="zh-CN" altLang="en-US" sz="2000" dirty="0"/>
           </a:p>
@@ -5783,7 +5746,7 @@
         <p:spPr>
           <a:xfrm>
             <a:off x="10543540" y="6544310"/>
-            <a:ext cx="3115310" cy="2245360"/>
+            <a:ext cx="3115310" cy="2861310"/>
           </a:xfrm>
           <a:prstGeom prst="rect">
             <a:avLst/>
@@ -5796,10 +5759,26 @@
           </a:bodyPr>
           <a:p>
             <a:r>
-              <a:rPr lang="en-US" altLang="zh-CN" sz="2000" dirty="0"/>
-              <a:t>We use numerical solution rather than analytic solution because the equations are so complex. Thus, we don't need to use the sympy solver .</a:t>
-            </a:r>
-            <a:endParaRPr lang="en-US" altLang="zh-CN" sz="2000" dirty="0"/>
+              <a:rPr sz="2000" dirty="0">
+                <a:sym typeface="+mn-ea"/>
+              </a:rPr>
+              <a:t>Since the differential equations in the model are very complicated, here we use numerical solutions, skip the analytical solutions provided by sympy, and set the numerical </a:t>
+            </a:r>
+            <a:r>
+              <a:rPr lang="en-US" sz="2000" dirty="0">
+                <a:sym typeface="+mn-ea"/>
+              </a:rPr>
+              <a:t>resolution</a:t>
+            </a:r>
+            <a:r>
+              <a:rPr sz="2000" dirty="0">
+                <a:sym typeface="+mn-ea"/>
+              </a:rPr>
+              <a:t>.</a:t>
+            </a:r>
+            <a:endParaRPr sz="2000" dirty="0">
+              <a:sym typeface="+mn-ea"/>
+            </a:endParaRPr>
           </a:p>
         </p:txBody>
       </p:sp>
@@ -5945,7 +5924,7 @@
       </p:sp>
       <p:pic>
         <p:nvPicPr>
-          <p:cNvPr id="6" name="图片 5" descr="/Users/mac/Documents/github/BrainPy-Models/docs/brainpy_handbook/figs/codes/cann_init.pngcann_init"/>
+          <p:cNvPr id="6" name="图片 5" descr="/Users/mac/Desktop/cann1.pngcann1"/>
           <p:cNvPicPr>
             <a:picLocks noChangeAspect="1"/>
           </p:cNvPicPr>
@@ -5960,8 +5939,8 @@
         </p:blipFill>
         <p:spPr>
           <a:xfrm>
-            <a:off x="-254" y="2566057"/>
-            <a:ext cx="10604275" cy="11137900"/>
+            <a:off x="0" y="2566057"/>
+            <a:ext cx="10122535" cy="11137900"/>
           </a:xfrm>
           <a:prstGeom prst="rect">
             <a:avLst/>
@@ -6015,8 +5994,8 @@
             </p:nvSpPr>
             <p:spPr>
               <a:xfrm>
-                <a:off x="8950960" y="12594590"/>
-                <a:ext cx="4333875" cy="969645"/>
+                <a:off x="8950960" y="12887960"/>
+                <a:ext cx="4333875" cy="415290"/>
               </a:xfrm>
               <a:prstGeom prst="rect">
                 <a:avLst/>
@@ -6027,13 +6006,6 @@
               <a:bodyPr wrap="square" rtlCol="0">
                 <a:spAutoFit/>
               </a:bodyPr>
-              <a:p>
-                <a:r>
-                  <a:rPr lang="en-US" altLang="zh-CN" dirty="0"/>
-                  <a:t>Distances on the ring:</a:t>
-                </a:r>
-                <a:endParaRPr lang="en-US" altLang="zh-CN" dirty="0"/>
-              </a:p>
               <a:p>
                 <a14:m>
                   <m:oMath xmlns:m="http://schemas.openxmlformats.org/officeDocument/2006/math">
@@ -6083,25 +6055,6 @@
                     <a:cs typeface="Cambria Math" panose="02040503050406030204" pitchFamily="18" charset="0"/>
                   </a:rPr>
                   <a:t> </a:t>
-                </a:r>
-                <a:endParaRPr lang="en-US" altLang="zh-CN" i="1" dirty="0">
-                  <a:latin typeface="Cambria Math" panose="02040503050406030204" pitchFamily="18" charset="0"/>
-                  <a:cs typeface="Cambria Math" panose="02040503050406030204" pitchFamily="18" charset="0"/>
-                </a:endParaRPr>
-              </a:p>
-              <a:p>
-                <a:r>
-                  <a:rPr lang="en-US" altLang="zh-CN" i="1" dirty="0">
-                    <a:cs typeface="+mn-lt"/>
-                  </a:rPr>
-                  <a:t>z_range denotes the range of </a:t>
-                </a:r>
-                <a:r>
-                  <a:rPr lang="en-US" altLang="zh-CN" i="1" dirty="0">
-                    <a:latin typeface="Cambria Math" panose="02040503050406030204" pitchFamily="18" charset="0"/>
-                    <a:cs typeface="Cambria Math" panose="02040503050406030204" pitchFamily="18" charset="0"/>
-                  </a:rPr>
-                  <a:t>x </a:t>
                 </a:r>
                 <a:endParaRPr lang="en-US" altLang="zh-CN" i="1" dirty="0">
                   <a:latin typeface="Cambria Math" panose="02040503050406030204" pitchFamily="18" charset="0"/>
@@ -6122,8 +6075,8 @@
             </p:nvSpPr>
             <p:spPr>
               <a:xfrm>
-                <a:off x="8950960" y="12594590"/>
-                <a:ext cx="4333875" cy="969645"/>
+                <a:off x="8950960" y="12887960"/>
+                <a:ext cx="4333875" cy="415290"/>
               </a:xfrm>
               <a:prstGeom prst="rect">
                 <a:avLst/>
@@ -6150,6 +6103,94 @@
           </p:sp>
         </mc:Fallback>
       </mc:AlternateContent>
+      <p:sp>
+        <p:nvSpPr>
+          <p:cNvPr id="2" name="右大括号 1"/>
+          <p:cNvSpPr/>
+          <p:nvPr/>
+        </p:nvSpPr>
+        <p:spPr>
+          <a:xfrm>
+            <a:off x="9568180" y="8296910"/>
+            <a:ext cx="216000" cy="1080000"/>
+          </a:xfrm>
+          <a:prstGeom prst="rightBrace">
+            <a:avLst/>
+          </a:prstGeom>
+        </p:spPr>
+        <p:style>
+          <a:lnRef idx="1">
+            <a:schemeClr val="dk1"/>
+          </a:lnRef>
+          <a:fillRef idx="0">
+            <a:schemeClr val="dk1"/>
+          </a:fillRef>
+          <a:effectRef idx="0">
+            <a:schemeClr val="dk1"/>
+          </a:effectRef>
+          <a:fontRef idx="minor">
+            <a:schemeClr val="tx1"/>
+          </a:fontRef>
+        </p:style>
+        <p:txBody>
+          <a:bodyPr rtlCol="0" anchor="ctr"/>
+          <a:p>
+            <a:pPr algn="ctr"/>
+            <a:endParaRPr lang="zh-CN" altLang="en-US"/>
+          </a:p>
+        </p:txBody>
+      </p:sp>
+      <p:sp>
+        <p:nvSpPr>
+          <p:cNvPr id="3" name="文本框 2"/>
+          <p:cNvSpPr txBox="1"/>
+          <p:nvPr/>
+        </p:nvSpPr>
+        <p:spPr>
+          <a:xfrm>
+            <a:off x="9997440" y="8451850"/>
+            <a:ext cx="3082290" cy="645160"/>
+          </a:xfrm>
+          <a:prstGeom prst="rect">
+            <a:avLst/>
+          </a:prstGeom>
+          <a:noFill/>
+        </p:spPr>
+        <p:txBody>
+          <a:bodyPr wrap="square" rtlCol="0" anchor="t">
+            <a:spAutoFit/>
+          </a:bodyPr>
+          <a:p>
+            <a:r>
+              <a:rPr lang="en-US" altLang="zh-CN" i="1" dirty="0">
+                <a:cs typeface="+mn-lt"/>
+                <a:sym typeface="+mn-ea"/>
+              </a:rPr>
+              <a:t>z_range </a:t>
+            </a:r>
+            <a:r>
+              <a:rPr lang="en-US" altLang="zh-CN" i="1" dirty="0">
+                <a:cs typeface="+mn-lt"/>
+                <a:sym typeface="+mn-ea"/>
+              </a:rPr>
+              <a:t>denotes the range of </a:t>
+            </a:r>
+            <a:r>
+              <a:rPr lang="en-US" altLang="zh-CN" i="1" dirty="0">
+                <a:latin typeface="Cambria Math" panose="02040503050406030204" pitchFamily="18" charset="0"/>
+                <a:cs typeface="Cambria Math" panose="02040503050406030204" pitchFamily="18" charset="0"/>
+                <a:sym typeface="+mn-ea"/>
+              </a:rPr>
+              <a:t>x .</a:t>
+            </a:r>
+            <a:endParaRPr lang="zh-CN" altLang="en-US" i="1" dirty="0">
+              <a:latin typeface="Cambria Math" panose="02040503050406030204" pitchFamily="18" charset="0"/>
+              <a:cs typeface="Cambria Math" panose="02040503050406030204" pitchFamily="18" charset="0"/>
+              <a:sym typeface="+mn-ea"/>
+            </a:endParaRPr>
+          </a:p>
+        </p:txBody>
+      </p:sp>
     </p:spTree>
   </p:cSld>
   <p:clrMapOvr>
@@ -6224,7 +6265,7 @@
       </p:sp>
       <p:pic>
         <p:nvPicPr>
-          <p:cNvPr id="6" name="图片 5" descr="/Users/mac/Documents/github/BrainPy-Models/docs/brainpy_handbook/figs/codes/cann_f.pngcann_f"/>
+          <p:cNvPr id="6" name="图片 5" descr="/Users/mac/Desktop/cann2.pngcann2"/>
           <p:cNvPicPr>
             <a:picLocks noChangeAspect="1"/>
           </p:cNvPicPr>
@@ -6239,8 +6280,8 @@
         </p:blipFill>
         <p:spPr>
           <a:xfrm>
-            <a:off x="-254" y="2870857"/>
-            <a:ext cx="10693816" cy="10617200"/>
+            <a:off x="0" y="2842917"/>
+            <a:ext cx="10196195" cy="10617200"/>
           </a:xfrm>
           <a:prstGeom prst="rect">
             <a:avLst/>
@@ -6292,7 +6333,7 @@
         </p:nvSpPr>
         <p:spPr>
           <a:xfrm>
-            <a:off x="8997315" y="6565265"/>
+            <a:off x="8175625" y="6365875"/>
             <a:ext cx="216000" cy="900000"/>
           </a:xfrm>
           <a:prstGeom prst="rightBrace">
@@ -6329,7 +6370,7 @@
         </p:nvSpPr>
         <p:spPr>
           <a:xfrm>
-            <a:off x="10113645" y="9566275"/>
+            <a:off x="8769350" y="9589135"/>
             <a:ext cx="216000" cy="648000"/>
           </a:xfrm>
           <a:prstGeom prst="rightBrace">
@@ -6368,8 +6409,8 @@
             </p:nvSpPr>
             <p:spPr>
               <a:xfrm>
-                <a:off x="10481881" y="9379521"/>
-                <a:ext cx="2739390" cy="883920"/>
+                <a:off x="9165590" y="9402445"/>
+                <a:ext cx="3569335" cy="883920"/>
               </a:xfrm>
               <a:prstGeom prst="rect">
                 <a:avLst/>
@@ -6377,7 +6418,7 @@
               <a:noFill/>
             </p:spPr>
             <p:txBody>
-              <a:bodyPr wrap="none" rtlCol="0" anchor="t">
+              <a:bodyPr wrap="square" rtlCol="0" anchor="t">
                 <a:spAutoFit/>
               </a:bodyPr>
               <a:p>
@@ -6385,7 +6426,7 @@
                 <a14:m>
                   <m:oMathPara xmlns:m="http://schemas.openxmlformats.org/officeDocument/2006/math">
                     <m:oMathParaPr>
-                      <m:jc m:val="centerGroup"/>
+                      <m:jc m:val="left"/>
                     </m:oMathParaPr>
                     <m:oMath xmlns:m="http://schemas.openxmlformats.org/officeDocument/2006/math">
                       <m:r>
@@ -6603,8 +6644,8 @@
             </p:nvSpPr>
             <p:spPr>
               <a:xfrm>
-                <a:off x="10481881" y="9379521"/>
-                <a:ext cx="2739390" cy="883920"/>
+                <a:off x="9165590" y="9402445"/>
+                <a:ext cx="3569335" cy="883920"/>
               </a:xfrm>
               <a:prstGeom prst="rect">
                 <a:avLst/>
@@ -6612,7 +6653,7 @@
               <a:blipFill rotWithShape="1">
                 <a:blip r:embed="rId2"/>
                 <a:stretch>
-                  <a:fillRect l="-21" t="-65" r="21" b="65"/>
+                  <a:fillRect/>
                 </a:stretch>
               </a:blipFill>
             </p:spPr>
@@ -6639,7 +6680,7 @@
         </p:nvSpPr>
         <p:spPr>
           <a:xfrm>
-            <a:off x="8753475" y="8563610"/>
+            <a:off x="8175625" y="8539480"/>
             <a:ext cx="216000" cy="900000"/>
           </a:xfrm>
           <a:prstGeom prst="rightBrace">
@@ -6676,8 +6717,8 @@
         </p:nvSpPr>
         <p:spPr>
           <a:xfrm>
-            <a:off x="9165590" y="8508365"/>
-            <a:ext cx="2323465" cy="922020"/>
+            <a:off x="8610600" y="8359775"/>
+            <a:ext cx="2937510" cy="1014730"/>
           </a:xfrm>
           <a:prstGeom prst="rect">
             <a:avLst/>
@@ -6691,26 +6732,26 @@
           <a:p>
             <a:pPr algn="l"/>
             <a:r>
-              <a:rPr lang="en-US" altLang="zh-CN" i="1">
+              <a:rPr lang="en-US" altLang="zh-CN" sz="2000" i="1">
+                <a:cs typeface="+mn-lt"/>
+              </a:rPr>
+              <a:t>Compute the distance matrix (</a:t>
+            </a:r>
+            <a:r>
+              <a:rPr lang="en-US" altLang="zh-CN" sz="2000" i="1">
                 <a:latin typeface="Cambria Math" panose="02040503050406030204" pitchFamily="18" charset="0"/>
                 <a:cs typeface="Cambria Math" panose="02040503050406030204" pitchFamily="18" charset="0"/>
+                <a:sym typeface="+mn-ea"/>
               </a:rPr>
               <a:t>d=|x-x'|</a:t>
             </a:r>
-            <a:endParaRPr lang="en-US" altLang="zh-CN" i="1">
-              <a:latin typeface="Cambria Math" panose="02040503050406030204" pitchFamily="18" charset="0"/>
-              <a:cs typeface="Cambria Math" panose="02040503050406030204" pitchFamily="18" charset="0"/>
-            </a:endParaRPr>
-          </a:p>
-          <a:p>
-            <a:pPr algn="l"/>
-            <a:r>
-              <a:rPr lang="en-US" altLang="zh-CN" i="1">
+            <a:r>
+              <a:rPr lang="en-US" altLang="zh-CN" sz="2000" i="1">
                 <a:cs typeface="+mn-lt"/>
               </a:rPr>
-              <a:t>Get a matrix of d for all positions</a:t>
-            </a:r>
-            <a:endParaRPr lang="en-US" altLang="zh-CN" i="1">
+              <a:t>) for all positions</a:t>
+            </a:r>
+            <a:endParaRPr lang="en-US" altLang="zh-CN" sz="2000" i="1">
               <a:cs typeface="+mn-lt"/>
             </a:endParaRPr>
           </a:p>
@@ -6732,7 +6773,7 @@
         </p:blipFill>
         <p:spPr>
           <a:xfrm>
-            <a:off x="11412855" y="8342630"/>
+            <a:off x="12093575" y="8322310"/>
             <a:ext cx="1443355" cy="895350"/>
           </a:xfrm>
           <a:prstGeom prst="rect">
@@ -6740,18 +6781,71 @@
           </a:prstGeom>
         </p:spPr>
       </p:pic>
+      <p:sp>
+        <p:nvSpPr>
+          <p:cNvPr id="10" name="文本框 9"/>
+          <p:cNvSpPr txBox="1"/>
+          <p:nvPr/>
+        </p:nvSpPr>
+        <p:spPr>
+          <a:xfrm>
+            <a:off x="8684895" y="6294755"/>
+            <a:ext cx="4959985" cy="1014730"/>
+          </a:xfrm>
+          <a:prstGeom prst="rect">
+            <a:avLst/>
+          </a:prstGeom>
+          <a:noFill/>
+        </p:spPr>
+        <p:txBody>
+          <a:bodyPr wrap="square" rtlCol="0">
+            <a:spAutoFit/>
+          </a:bodyPr>
+          <a:p>
+            <a:r>
+              <a:rPr lang="en-US" altLang="zh-CN" sz="2000" dirty="0"/>
+              <a:t>Distances on the ring:</a:t>
+            </a:r>
+            <a:endParaRPr lang="zh-CN" altLang="en-US" sz="2000" dirty="0"/>
+          </a:p>
+          <a:p>
+            <a:r>
+              <a:rPr sz="2000" dirty="0">
+                <a:sym typeface="+mn-ea"/>
+              </a:rPr>
+              <a:t>The farthest distance is half of z_range, so d </a:t>
+            </a:r>
+            <a:r>
+              <a:rPr lang="en-US" sz="2000" dirty="0">
+                <a:sym typeface="+mn-ea"/>
+              </a:rPr>
+              <a:t>should</a:t>
+            </a:r>
+            <a:r>
+              <a:rPr sz="2000" dirty="0">
+                <a:sym typeface="+mn-ea"/>
+              </a:rPr>
+              <a:t> not exceed 0.5 * z_range</a:t>
+            </a:r>
+            <a:endParaRPr lang="en-US" altLang="zh-CN" sz="2000" i="1" dirty="0">
+              <a:latin typeface="Cambria Math" panose="02040503050406030204" pitchFamily="18" charset="0"/>
+              <a:cs typeface="Cambria Math" panose="02040503050406030204" pitchFamily="18" charset="0"/>
+            </a:endParaRPr>
+          </a:p>
+        </p:txBody>
+      </p:sp>
       <mc:AlternateContent xmlns:mc="http://schemas.openxmlformats.org/markup-compatibility/2006">
         <mc:Choice xmlns:a14="http://schemas.microsoft.com/office/drawing/2010/main" Requires="a14">
           <p:sp>
             <p:nvSpPr>
-              <p:cNvPr id="10" name="文本框 9"/>
+              <p:cNvPr id="11" name="文本框 10"/>
               <p:cNvSpPr txBox="1"/>
               <p:nvPr/>
             </p:nvSpPr>
             <p:spPr>
               <a:xfrm>
-                <a:off x="9382125" y="6185535"/>
-                <a:ext cx="4333875" cy="1618615"/>
+                <a:off x="6083935" y="3934460"/>
+                <a:ext cx="4930775" cy="782955"/>
               </a:xfrm>
               <a:prstGeom prst="rect">
                 <a:avLst/>
@@ -6759,215 +6853,262 @@
               <a:noFill/>
             </p:spPr>
             <p:txBody>
-              <a:bodyPr wrap="square" rtlCol="0">
+              <a:bodyPr wrap="square" rtlCol="0" anchor="t">
                 <a:spAutoFit/>
               </a:bodyPr>
               <a:p>
-                <a:r>
-                  <a:rPr lang="en-US" altLang="zh-CN" dirty="0"/>
-                  <a:t>Distances on the ring:</a:t>
-                </a:r>
-                <a:endParaRPr lang="en-US" altLang="zh-CN" dirty="0"/>
-              </a:p>
-              <a:p>
-                <a:r>
-                  <a:rPr lang="en-US" altLang="zh-CN" dirty="0">
-                    <a:latin typeface="Cambria Math" panose="02040503050406030204" pitchFamily="18" charset="0"/>
-                    <a:cs typeface="Cambria Math" panose="02040503050406030204" pitchFamily="18" charset="0"/>
-                  </a:rPr>
-                  <a:t>x </a:t>
-                </a:r>
-                <a:r>
-                  <a:rPr lang="en-US" altLang="zh-CN" dirty="0">
-                    <a:cs typeface="+mn-lt"/>
-                  </a:rPr>
-                  <a:t>is the position of the ring, so we have:</a:t>
-                </a:r>
-                <a:r>
-                  <a:rPr lang="en-US" altLang="zh-CN" dirty="0">
-                    <a:latin typeface="Cambria Math" panose="02040503050406030204" pitchFamily="18" charset="0"/>
-                    <a:cs typeface="Cambria Math" panose="02040503050406030204" pitchFamily="18" charset="0"/>
-                  </a:rPr>
-                  <a:t> </a:t>
-                </a:r>
+                <a:pPr algn="l"/>
                 <a14:m>
-                  <m:oMath xmlns:m="http://schemas.openxmlformats.org/officeDocument/2006/math">
-                    <m:r>
-                      <a:rPr lang="en-US" altLang="zh-CN" i="1" dirty="0">
-                        <a:latin typeface="Cambria Math" panose="02040503050406030204" pitchFamily="18" charset="0"/>
-                        <a:cs typeface="Cambria Math" panose="02040503050406030204" pitchFamily="18" charset="0"/>
-                      </a:rPr>
-                      <m:t>𝑥</m:t>
-                    </m:r>
-                    <m:r>
-                      <a:rPr lang="en-US" altLang="zh-CN" i="1" dirty="0">
-                        <a:latin typeface="Cambria Math" panose="02040503050406030204" pitchFamily="18" charset="0"/>
-                        <a:cs typeface="Cambria Math" panose="02040503050406030204" pitchFamily="18" charset="0"/>
-                      </a:rPr>
-                      <m:t>∈[−</m:t>
-                    </m:r>
-                    <m:r>
-                      <a:rPr lang="en-US" altLang="zh-CN" i="1" dirty="0">
-                        <a:latin typeface="Cambria Math" panose="02040503050406030204" pitchFamily="18" charset="0"/>
-                        <a:cs typeface="Cambria Math" panose="02040503050406030204" pitchFamily="18" charset="0"/>
-                      </a:rPr>
-                      <m:t>𝜋</m:t>
-                    </m:r>
-                    <m:r>
-                      <a:rPr lang="en-US" altLang="zh-CN" i="1" dirty="0">
-                        <a:latin typeface="Cambria Math" panose="02040503050406030204" pitchFamily="18" charset="0"/>
-                        <a:cs typeface="Cambria Math" panose="02040503050406030204" pitchFamily="18" charset="0"/>
-                      </a:rPr>
-                      <m:t>, </m:t>
-                    </m:r>
-                    <m:r>
-                      <a:rPr lang="en-US" altLang="zh-CN" i="1" dirty="0">
-                        <a:latin typeface="Cambria Math" panose="02040503050406030204" pitchFamily="18" charset="0"/>
-                        <a:cs typeface="Cambria Math" panose="02040503050406030204" pitchFamily="18" charset="0"/>
-                      </a:rPr>
-                      <m:t>𝜋</m:t>
-                    </m:r>
-                    <m:r>
-                      <a:rPr lang="en-US" altLang="zh-CN" i="1" dirty="0">
-                        <a:latin typeface="Cambria Math" panose="02040503050406030204" pitchFamily="18" charset="0"/>
-                        <a:cs typeface="Cambria Math" panose="02040503050406030204" pitchFamily="18" charset="0"/>
-                      </a:rPr>
-                      <m:t>]</m:t>
-                    </m:r>
-                  </m:oMath>
+                  <m:oMathPara xmlns:m="http://schemas.openxmlformats.org/officeDocument/2006/math">
+                    <m:oMathParaPr>
+                      <m:jc m:val="left"/>
+                    </m:oMathParaPr>
+                    <m:oMath xmlns:m="http://schemas.openxmlformats.org/officeDocument/2006/math">
+                      <m:r>
+                        <a:rPr lang="en-US" altLang="zh-CN" sz="2000" i="1">
+                          <a:latin typeface="Cambria Math" panose="02040503050406030204" pitchFamily="18" charset="0"/>
+                          <a:cs typeface="Cambria Math" panose="02040503050406030204" pitchFamily="18" charset="0"/>
+                        </a:rPr>
+                        <m:t>𝑟</m:t>
+                      </m:r>
+                      <m:r>
+                        <a:rPr lang="en-US" altLang="zh-CN" sz="2000" i="1">
+                          <a:latin typeface="Cambria Math" panose="02040503050406030204" pitchFamily="18" charset="0"/>
+                          <a:cs typeface="Cambria Math" panose="02040503050406030204" pitchFamily="18" charset="0"/>
+                        </a:rPr>
+                        <m:t>(</m:t>
+                      </m:r>
+                      <m:r>
+                        <a:rPr lang="en-US" altLang="zh-CN" sz="2000" i="1">
+                          <a:latin typeface="Cambria Math" panose="02040503050406030204" pitchFamily="18" charset="0"/>
+                          <a:cs typeface="Cambria Math" panose="02040503050406030204" pitchFamily="18" charset="0"/>
+                        </a:rPr>
+                        <m:t>𝑥</m:t>
+                      </m:r>
+                      <m:r>
+                        <a:rPr lang="en-US" altLang="zh-CN" sz="2000" i="1">
+                          <a:latin typeface="Cambria Math" panose="02040503050406030204" pitchFamily="18" charset="0"/>
+                          <a:cs typeface="Cambria Math" panose="02040503050406030204" pitchFamily="18" charset="0"/>
+                        </a:rPr>
+                        <m:t>, </m:t>
+                      </m:r>
+                      <m:r>
+                        <a:rPr lang="en-US" altLang="zh-CN" sz="2000" i="1">
+                          <a:latin typeface="Cambria Math" panose="02040503050406030204" pitchFamily="18" charset="0"/>
+                          <a:cs typeface="Cambria Math" panose="02040503050406030204" pitchFamily="18" charset="0"/>
+                        </a:rPr>
+                        <m:t>𝑡</m:t>
+                      </m:r>
+                      <m:r>
+                        <a:rPr lang="en-US" altLang="zh-CN" sz="2000" i="1">
+                          <a:latin typeface="Cambria Math" panose="02040503050406030204" pitchFamily="18" charset="0"/>
+                          <a:cs typeface="Cambria Math" panose="02040503050406030204" pitchFamily="18" charset="0"/>
+                        </a:rPr>
+                        <m:t>)=</m:t>
+                      </m:r>
+                      <m:f>
+                        <m:fPr>
+                          <m:ctrlPr>
+                            <a:rPr lang="en-US" altLang="zh-CN" sz="2000" i="1">
+                              <a:latin typeface="Cambria Math" panose="02040503050406030204" pitchFamily="18" charset="0"/>
+                              <a:cs typeface="Cambria Math" panose="02040503050406030204" pitchFamily="18" charset="0"/>
+                            </a:rPr>
+                          </m:ctrlPr>
+                        </m:fPr>
+                        <m:num>
+                          <m:r>
+                            <a:rPr lang="en-US" altLang="zh-CN" sz="2000" i="1">
+                              <a:latin typeface="Cambria Math" panose="02040503050406030204" pitchFamily="18" charset="0"/>
+                              <a:cs typeface="Cambria Math" panose="02040503050406030204" pitchFamily="18" charset="0"/>
+                            </a:rPr>
+                            <m:t>𝑢</m:t>
+                          </m:r>
+                          <m:r>
+                            <a:rPr lang="en-US" altLang="zh-CN" sz="2000" i="1">
+                              <a:latin typeface="Cambria Math" panose="02040503050406030204" pitchFamily="18" charset="0"/>
+                              <a:cs typeface="Cambria Math" panose="02040503050406030204" pitchFamily="18" charset="0"/>
+                            </a:rPr>
+                            <m:t>(</m:t>
+                          </m:r>
+                          <m:r>
+                            <a:rPr lang="en-US" altLang="zh-CN" sz="2000" i="1">
+                              <a:latin typeface="Cambria Math" panose="02040503050406030204" pitchFamily="18" charset="0"/>
+                              <a:cs typeface="Cambria Math" panose="02040503050406030204" pitchFamily="18" charset="0"/>
+                            </a:rPr>
+                            <m:t>𝑥</m:t>
+                          </m:r>
+                          <m:r>
+                            <a:rPr lang="en-US" altLang="zh-CN" sz="2000" i="1">
+                              <a:latin typeface="Cambria Math" panose="02040503050406030204" pitchFamily="18" charset="0"/>
+                              <a:cs typeface="Cambria Math" panose="02040503050406030204" pitchFamily="18" charset="0"/>
+                            </a:rPr>
+                            <m:t>, </m:t>
+                          </m:r>
+                          <m:r>
+                            <a:rPr lang="en-US" altLang="zh-CN" sz="2000" i="1">
+                              <a:latin typeface="Cambria Math" panose="02040503050406030204" pitchFamily="18" charset="0"/>
+                              <a:cs typeface="Cambria Math" panose="02040503050406030204" pitchFamily="18" charset="0"/>
+                            </a:rPr>
+                            <m:t>𝑡</m:t>
+                          </m:r>
+                          <m:sSup>
+                            <m:sSupPr>
+                              <m:ctrlPr>
+                                <a:rPr lang="en-US" altLang="zh-CN" sz="2000" i="1">
+                                  <a:latin typeface="Cambria Math" panose="02040503050406030204" pitchFamily="18" charset="0"/>
+                                  <a:cs typeface="Cambria Math" panose="02040503050406030204" pitchFamily="18" charset="0"/>
+                                </a:rPr>
+                              </m:ctrlPr>
+                            </m:sSupPr>
+                            <m:e>
+                              <m:r>
+                                <a:rPr lang="en-US" altLang="zh-CN" sz="2000" i="1">
+                                  <a:latin typeface="Cambria Math" panose="02040503050406030204" pitchFamily="18" charset="0"/>
+                                  <a:cs typeface="Cambria Math" panose="02040503050406030204" pitchFamily="18" charset="0"/>
+                                </a:rPr>
+                                <m:t>)</m:t>
+                              </m:r>
+                            </m:e>
+                            <m:sup>
+                              <m:r>
+                                <a:rPr lang="en-US" altLang="zh-CN" sz="2000" i="1">
+                                  <a:latin typeface="Cambria Math" panose="02040503050406030204" pitchFamily="18" charset="0"/>
+                                  <a:cs typeface="Cambria Math" panose="02040503050406030204" pitchFamily="18" charset="0"/>
+                                </a:rPr>
+                                <m:t>2</m:t>
+                              </m:r>
+                            </m:sup>
+                          </m:sSup>
+                        </m:num>
+                        <m:den>
+                          <m:r>
+                            <a:rPr lang="en-US" altLang="zh-CN" sz="2000" i="1">
+                              <a:latin typeface="Cambria Math" panose="02040503050406030204" pitchFamily="18" charset="0"/>
+                              <a:cs typeface="Cambria Math" panose="02040503050406030204" pitchFamily="18" charset="0"/>
+                            </a:rPr>
+                            <m:t>1</m:t>
+                          </m:r>
+                          <m:r>
+                            <a:rPr lang="en-US" altLang="zh-CN" sz="2000" i="1">
+                              <a:latin typeface="Cambria Math" panose="02040503050406030204" pitchFamily="18" charset="0"/>
+                              <a:cs typeface="Cambria Math" panose="02040503050406030204" pitchFamily="18" charset="0"/>
+                            </a:rPr>
+                            <m:t>+</m:t>
+                          </m:r>
+                          <m:r>
+                            <a:rPr lang="en-US" altLang="zh-CN" sz="2000" i="1">
+                              <a:latin typeface="Cambria Math" panose="02040503050406030204" pitchFamily="18" charset="0"/>
+                              <a:cs typeface="Cambria Math" panose="02040503050406030204" pitchFamily="18" charset="0"/>
+                            </a:rPr>
+                            <m:t>𝑘</m:t>
+                          </m:r>
+                          <m:r>
+                            <a:rPr lang="en-US" altLang="zh-CN" sz="2000" i="1">
+                              <a:latin typeface="Cambria Math" panose="02040503050406030204" pitchFamily="18" charset="0"/>
+                              <a:cs typeface="Cambria Math" panose="02040503050406030204" pitchFamily="18" charset="0"/>
+                            </a:rPr>
+                            <m:t>𝜌</m:t>
+                          </m:r>
+                          <m:nary>
+                            <m:naryPr>
+                              <m:limLoc m:val="undOvr"/>
+                              <m:subHide m:val="on"/>
+                              <m:supHide m:val="on"/>
+                              <m:ctrlPr>
+                                <a:rPr lang="en-US" altLang="zh-CN" sz="2000" i="1">
+                                  <a:latin typeface="Cambria Math" panose="02040503050406030204" pitchFamily="18" charset="0"/>
+                                  <a:cs typeface="Cambria Math" panose="02040503050406030204" pitchFamily="18" charset="0"/>
+                                </a:rPr>
+                              </m:ctrlPr>
+                            </m:naryPr>
+                            <m:sub/>
+                            <m:sup/>
+                            <m:e>
+                              <m:r>
+                                <a:rPr lang="en-US" altLang="zh-CN" sz="2000" i="1">
+                                  <a:latin typeface="Cambria Math" panose="02040503050406030204" pitchFamily="18" charset="0"/>
+                                  <a:cs typeface="Cambria Math" panose="02040503050406030204" pitchFamily="18" charset="0"/>
+                                </a:rPr>
+                                <m:t>𝑑𝑥</m:t>
+                              </m:r>
+                              <m:r>
+                                <a:rPr lang="en-US" altLang="zh-CN" sz="2000" i="1">
+                                  <a:latin typeface="Cambria Math" panose="02040503050406030204" pitchFamily="18" charset="0"/>
+                                  <a:cs typeface="Cambria Math" panose="02040503050406030204" pitchFamily="18" charset="0"/>
+                                </a:rPr>
+                                <m:t>'</m:t>
+                              </m:r>
+                              <m:r>
+                                <a:rPr lang="en-US" altLang="zh-CN" sz="2000" i="1">
+                                  <a:latin typeface="Cambria Math" panose="02040503050406030204" pitchFamily="18" charset="0"/>
+                                  <a:cs typeface="Cambria Math" panose="02040503050406030204" pitchFamily="18" charset="0"/>
+                                </a:rPr>
+                                <m:t>𝑢</m:t>
+                              </m:r>
+                              <m:r>
+                                <a:rPr lang="en-US" altLang="zh-CN" sz="2000" i="1">
+                                  <a:latin typeface="Cambria Math" panose="02040503050406030204" pitchFamily="18" charset="0"/>
+                                  <a:cs typeface="Cambria Math" panose="02040503050406030204" pitchFamily="18" charset="0"/>
+                                </a:rPr>
+                                <m:t>(</m:t>
+                              </m:r>
+                              <m:r>
+                                <a:rPr lang="en-US" altLang="zh-CN" sz="2000" i="1">
+                                  <a:latin typeface="Cambria Math" panose="02040503050406030204" pitchFamily="18" charset="0"/>
+                                  <a:cs typeface="Cambria Math" panose="02040503050406030204" pitchFamily="18" charset="0"/>
+                                </a:rPr>
+                                <m:t>𝑥</m:t>
+                              </m:r>
+                              <m:r>
+                                <a:rPr lang="en-US" altLang="zh-CN" sz="2000" i="1">
+                                  <a:latin typeface="Cambria Math" panose="02040503050406030204" pitchFamily="18" charset="0"/>
+                                  <a:cs typeface="Cambria Math" panose="02040503050406030204" pitchFamily="18" charset="0"/>
+                                </a:rPr>
+                                <m:t>', </m:t>
+                              </m:r>
+                              <m:r>
+                                <a:rPr lang="en-US" altLang="zh-CN" sz="2000" i="1">
+                                  <a:latin typeface="Cambria Math" panose="02040503050406030204" pitchFamily="18" charset="0"/>
+                                  <a:cs typeface="Cambria Math" panose="02040503050406030204" pitchFamily="18" charset="0"/>
+                                </a:rPr>
+                                <m:t>𝑡</m:t>
+                              </m:r>
+                              <m:sSup>
+                                <m:sSupPr>
+                                  <m:ctrlPr>
+                                    <a:rPr lang="en-US" altLang="zh-CN" sz="2000" i="1">
+                                      <a:latin typeface="Cambria Math" panose="02040503050406030204" pitchFamily="18" charset="0"/>
+                                      <a:cs typeface="Cambria Math" panose="02040503050406030204" pitchFamily="18" charset="0"/>
+                                    </a:rPr>
+                                  </m:ctrlPr>
+                                </m:sSupPr>
+                                <m:e>
+                                  <m:r>
+                                    <a:rPr lang="en-US" altLang="zh-CN" sz="2000" i="1">
+                                      <a:latin typeface="Cambria Math" panose="02040503050406030204" pitchFamily="18" charset="0"/>
+                                      <a:cs typeface="Cambria Math" panose="02040503050406030204" pitchFamily="18" charset="0"/>
+                                    </a:rPr>
+                                    <m:t>)</m:t>
+                                  </m:r>
+                                </m:e>
+                                <m:sup>
+                                  <m:r>
+                                    <a:rPr lang="en-US" altLang="zh-CN" sz="2000" i="1">
+                                      <a:latin typeface="Cambria Math" panose="02040503050406030204" pitchFamily="18" charset="0"/>
+                                      <a:cs typeface="Cambria Math" panose="02040503050406030204" pitchFamily="18" charset="0"/>
+                                    </a:rPr>
+                                    <m:t>2</m:t>
+                                  </m:r>
+                                </m:sup>
+                              </m:sSup>
+                            </m:e>
+                          </m:nary>
+                        </m:den>
+                      </m:f>
+                    </m:oMath>
+                  </m:oMathPara>
                 </a14:m>
-                <a:r>
-                  <a:rPr lang="en-US" altLang="zh-CN" i="1" dirty="0">
-                    <a:latin typeface="Cambria Math" panose="02040503050406030204" pitchFamily="18" charset="0"/>
-                    <a:cs typeface="Cambria Math" panose="02040503050406030204" pitchFamily="18" charset="0"/>
-                  </a:rPr>
-                  <a:t> </a:t>
-                </a:r>
-                <a:endParaRPr lang="en-US" altLang="zh-CN" i="1" dirty="0">
-                  <a:latin typeface="Cambria Math" panose="02040503050406030204" pitchFamily="18" charset="0"/>
-                  <a:cs typeface="Cambria Math" panose="02040503050406030204" pitchFamily="18" charset="0"/>
-                </a:endParaRPr>
-              </a:p>
-              <a:p>
-                <a:r>
-                  <a:rPr lang="en-US" altLang="zh-CN" i="1" dirty="0">
-                    <a:cs typeface="+mn-lt"/>
-                  </a:rPr>
-                  <a:t>z_range denotes the range of </a:t>
-                </a:r>
-                <a:r>
-                  <a:rPr lang="en-US" altLang="zh-CN" i="1" dirty="0">
-                    <a:latin typeface="Cambria Math" panose="02040503050406030204" pitchFamily="18" charset="0"/>
-                    <a:cs typeface="Cambria Math" panose="02040503050406030204" pitchFamily="18" charset="0"/>
-                  </a:rPr>
-                  <a:t>x (</a:t>
-                </a:r>
-                <a14:m>
-                  <m:oMath xmlns:m="http://schemas.openxmlformats.org/officeDocument/2006/math">
-                    <m:r>
-                      <a:rPr lang="en-US" altLang="zh-CN" i="1" dirty="0">
-                        <a:latin typeface="Cambria Math" panose="02040503050406030204" pitchFamily="18" charset="0"/>
-                        <a:cs typeface="Cambria Math" panose="02040503050406030204" pitchFamily="18" charset="0"/>
-                      </a:rPr>
-                      <m:t>=</m:t>
-                    </m:r>
-                    <m:r>
-                      <a:rPr lang="en-US" altLang="zh-CN" i="1" dirty="0">
-                        <a:latin typeface="Cambria Math" panose="02040503050406030204" pitchFamily="18" charset="0"/>
-                        <a:cs typeface="Cambria Math" panose="02040503050406030204" pitchFamily="18" charset="0"/>
-                      </a:rPr>
-                      <m:t>2</m:t>
-                    </m:r>
-                    <m:r>
-                      <a:rPr lang="en-US" altLang="zh-CN" i="1" dirty="0">
-                        <a:latin typeface="Cambria Math" panose="02040503050406030204" pitchFamily="18" charset="0"/>
-                        <a:cs typeface="Cambria Math" panose="02040503050406030204" pitchFamily="18" charset="0"/>
-                      </a:rPr>
-                      <m:t>𝜋</m:t>
-                    </m:r>
-                  </m:oMath>
-                </a14:m>
-                <a:r>
-                  <a:rPr lang="en-US" altLang="zh-CN" i="1" dirty="0">
-                    <a:latin typeface="Cambria Math" panose="02040503050406030204" pitchFamily="18" charset="0"/>
-                    <a:cs typeface="Cambria Math" panose="02040503050406030204" pitchFamily="18" charset="0"/>
-                  </a:rPr>
-                  <a:t>).</a:t>
-                </a:r>
-                <a:endParaRPr lang="en-US" altLang="zh-CN" i="1" dirty="0">
-                  <a:latin typeface="Cambria Math" panose="02040503050406030204" pitchFamily="18" charset="0"/>
-                  <a:cs typeface="Cambria Math" panose="02040503050406030204" pitchFamily="18" charset="0"/>
-                </a:endParaRPr>
-              </a:p>
-              <a:p>
-                <a:r>
-                  <a:rPr lang="en-US" altLang="zh-CN" i="1" dirty="0">
-                    <a:cs typeface="+mn-lt"/>
-                  </a:rPr>
-                  <a:t>distance on the ring:</a:t>
-                </a:r>
-                <a14:m>
-                  <m:oMath xmlns:m="http://schemas.openxmlformats.org/officeDocument/2006/math">
-                    <m:r>
-                      <a:rPr lang="en-US" altLang="zh-CN" i="1" dirty="0">
-                        <a:latin typeface="Cambria Math" panose="02040503050406030204" pitchFamily="18" charset="0"/>
-                        <a:ea typeface="宋体" charset="0"/>
-                        <a:cs typeface="Cambria Math" panose="02040503050406030204" pitchFamily="18" charset="0"/>
-                      </a:rPr>
-                      <m:t> </m:t>
-                    </m:r>
-                    <m:r>
-                      <a:rPr lang="en-US" altLang="zh-CN" i="1" dirty="0">
-                        <a:latin typeface="Cambria Math" panose="02040503050406030204" pitchFamily="18" charset="0"/>
-                        <a:cs typeface="Cambria Math" panose="02040503050406030204" pitchFamily="18" charset="0"/>
-                      </a:rPr>
-                      <m:t>𝑑</m:t>
-                    </m:r>
-                    <m:r>
-                      <a:rPr lang="en-US" altLang="zh-CN" i="1" dirty="0">
-                        <a:latin typeface="Cambria Math" panose="02040503050406030204" pitchFamily="18" charset="0"/>
-                        <a:cs typeface="Cambria Math" panose="02040503050406030204" pitchFamily="18" charset="0"/>
-                      </a:rPr>
-                      <m:t>=|</m:t>
-                    </m:r>
-                    <m:r>
-                      <a:rPr lang="en-US" altLang="zh-CN" i="1" dirty="0">
-                        <a:latin typeface="Cambria Math" panose="02040503050406030204" pitchFamily="18" charset="0"/>
-                        <a:cs typeface="Cambria Math" panose="02040503050406030204" pitchFamily="18" charset="0"/>
-                      </a:rPr>
-                      <m:t>𝑥</m:t>
-                    </m:r>
-                    <m:r>
-                      <a:rPr lang="en-US" altLang="zh-CN" i="1" dirty="0">
-                        <a:latin typeface="Cambria Math" panose="02040503050406030204" pitchFamily="18" charset="0"/>
-                        <a:cs typeface="Cambria Math" panose="02040503050406030204" pitchFamily="18" charset="0"/>
-                      </a:rPr>
-                      <m:t>−</m:t>
-                    </m:r>
-                    <m:r>
-                      <a:rPr lang="en-US" altLang="zh-CN" i="1" dirty="0">
-                        <a:latin typeface="Cambria Math" panose="02040503050406030204" pitchFamily="18" charset="0"/>
-                        <a:cs typeface="Cambria Math" panose="02040503050406030204" pitchFamily="18" charset="0"/>
-                      </a:rPr>
-                      <m:t>𝑥</m:t>
-                    </m:r>
-                    <m:r>
-                      <a:rPr lang="en-US" altLang="zh-CN" i="1" dirty="0">
-                        <a:latin typeface="Cambria Math" panose="02040503050406030204" pitchFamily="18" charset="0"/>
-                        <a:cs typeface="Cambria Math" panose="02040503050406030204" pitchFamily="18" charset="0"/>
-                      </a:rPr>
-                      <m:t>'|&lt;</m:t>
-                    </m:r>
-                    <m:r>
-                      <a:rPr lang="en-US" altLang="zh-CN" i="1" dirty="0">
-                        <a:latin typeface="Cambria Math" panose="02040503050406030204" pitchFamily="18" charset="0"/>
-                        <a:cs typeface="Cambria Math" panose="02040503050406030204" pitchFamily="18" charset="0"/>
-                      </a:rPr>
-                      <m:t>𝜋</m:t>
-                    </m:r>
-                  </m:oMath>
-                </a14:m>
-                <a:endParaRPr lang="en-US" altLang="zh-CN" i="1" dirty="0">
+                <a:endParaRPr lang="en-US" altLang="zh-CN" sz="2000" i="1">
                   <a:latin typeface="Cambria Math" panose="02040503050406030204" pitchFamily="18" charset="0"/>
                   <a:cs typeface="Cambria Math" panose="02040503050406030204" pitchFamily="18" charset="0"/>
                 </a:endParaRPr>
@@ -6978,7 +7119,7 @@
         <mc:Fallback>
           <p:sp>
             <p:nvSpPr>
-              <p:cNvPr id="10" name="文本框 9"/>
+              <p:cNvPr id="11" name="文本框 10"/>
               <p:cNvSpPr txBox="1">
                 <a:spLocks noRot="1" noChangeAspect="1" noMove="1" noResize="1" noEditPoints="1" noAdjustHandles="1" noChangeArrowheads="1" noChangeShapeType="1" noTextEdit="1"/>
               </p:cNvSpPr>
@@ -6986,8 +7127,8 @@
             </p:nvSpPr>
             <p:spPr>
               <a:xfrm>
-                <a:off x="9382125" y="6185535"/>
-                <a:ext cx="4333875" cy="1618615"/>
+                <a:off x="6083935" y="3934460"/>
+                <a:ext cx="4930775" cy="782955"/>
               </a:xfrm>
               <a:prstGeom prst="rect">
                 <a:avLst/>
@@ -7014,322 +7155,6 @@
           </p:sp>
         </mc:Fallback>
       </mc:AlternateContent>
-      <mc:AlternateContent xmlns:mc="http://schemas.openxmlformats.org/markup-compatibility/2006">
-        <mc:Choice xmlns:a14="http://schemas.microsoft.com/office/drawing/2010/main" Requires="a14">
-          <p:sp>
-            <p:nvSpPr>
-              <p:cNvPr id="11" name="文本框 10"/>
-              <p:cNvSpPr txBox="1"/>
-              <p:nvPr/>
-            </p:nvSpPr>
-            <p:spPr>
-              <a:xfrm>
-                <a:off x="6088250" y="4045775"/>
-                <a:ext cx="2655570" cy="613410"/>
-              </a:xfrm>
-              <a:prstGeom prst="rect">
-                <a:avLst/>
-              </a:prstGeom>
-              <a:noFill/>
-            </p:spPr>
-            <p:txBody>
-              <a:bodyPr wrap="square" rtlCol="0" anchor="t">
-                <a:spAutoFit/>
-              </a:bodyPr>
-              <a:p>
-                <a:pPr algn="l"/>
-                <a:r>
-                  <a:rPr lang="en-US" altLang="zh-CN" sz="2000">
-                    <a:latin typeface="Cambria Math" panose="02040503050406030204" pitchFamily="18" charset="0"/>
-                    <a:cs typeface="Cambria Math" panose="02040503050406030204" pitchFamily="18" charset="0"/>
-                  </a:rPr>
-                  <a:t>r</a:t>
-                </a:r>
-                <a14:m>
-                  <m:oMath xmlns:m="http://schemas.openxmlformats.org/officeDocument/2006/math">
-                    <m:r>
-                      <a:rPr lang="en-US" altLang="zh-CN" sz="2000" i="1">
-                        <a:latin typeface="Cambria Math" panose="02040503050406030204" pitchFamily="18" charset="0"/>
-                        <a:cs typeface="Cambria Math" panose="02040503050406030204" pitchFamily="18" charset="0"/>
-                      </a:rPr>
-                      <m:t>(</m:t>
-                    </m:r>
-                    <m:r>
-                      <a:rPr lang="en-US" altLang="zh-CN" sz="2000" i="1">
-                        <a:latin typeface="Cambria Math" panose="02040503050406030204" pitchFamily="18" charset="0"/>
-                        <a:cs typeface="Cambria Math" panose="02040503050406030204" pitchFamily="18" charset="0"/>
-                      </a:rPr>
-                      <m:t>𝑥</m:t>
-                    </m:r>
-                    <m:r>
-                      <a:rPr lang="en-US" altLang="zh-CN" sz="2000" i="1">
-                        <a:latin typeface="Cambria Math" panose="02040503050406030204" pitchFamily="18" charset="0"/>
-                        <a:cs typeface="Cambria Math" panose="02040503050406030204" pitchFamily="18" charset="0"/>
-                      </a:rPr>
-                      <m:t>, </m:t>
-                    </m:r>
-                    <m:r>
-                      <a:rPr lang="en-US" altLang="zh-CN" sz="2000" i="1">
-                        <a:latin typeface="Cambria Math" panose="02040503050406030204" pitchFamily="18" charset="0"/>
-                        <a:cs typeface="Cambria Math" panose="02040503050406030204" pitchFamily="18" charset="0"/>
-                      </a:rPr>
-                      <m:t>𝑡</m:t>
-                    </m:r>
-                    <m:r>
-                      <a:rPr lang="en-US" altLang="zh-CN" sz="2000" i="1">
-                        <a:latin typeface="Cambria Math" panose="02040503050406030204" pitchFamily="18" charset="0"/>
-                        <a:cs typeface="Cambria Math" panose="02040503050406030204" pitchFamily="18" charset="0"/>
-                      </a:rPr>
-                      <m:t>)=</m:t>
-                    </m:r>
-                    <m:f>
-                      <m:fPr>
-                        <m:ctrlPr>
-                          <a:rPr lang="en-US" altLang="zh-CN" sz="2000" i="1">
-                            <a:latin typeface="Cambria Math" panose="02040503050406030204" pitchFamily="18" charset="0"/>
-                            <a:cs typeface="Cambria Math" panose="02040503050406030204" pitchFamily="18" charset="0"/>
-                          </a:rPr>
-                        </m:ctrlPr>
-                      </m:fPr>
-                      <m:num>
-                        <m:r>
-                          <a:rPr lang="en-US" altLang="zh-CN" sz="2000" i="1">
-                            <a:latin typeface="Cambria Math" panose="02040503050406030204" pitchFamily="18" charset="0"/>
-                            <a:cs typeface="Cambria Math" panose="02040503050406030204" pitchFamily="18" charset="0"/>
-                          </a:rPr>
-                          <m:t>𝑢</m:t>
-                        </m:r>
-                        <m:r>
-                          <a:rPr lang="en-US" altLang="zh-CN" sz="2000" i="1">
-                            <a:latin typeface="Cambria Math" panose="02040503050406030204" pitchFamily="18" charset="0"/>
-                            <a:cs typeface="Cambria Math" panose="02040503050406030204" pitchFamily="18" charset="0"/>
-                          </a:rPr>
-                          <m:t>(</m:t>
-                        </m:r>
-                        <m:r>
-                          <a:rPr lang="en-US" altLang="zh-CN" sz="2000" i="1">
-                            <a:latin typeface="Cambria Math" panose="02040503050406030204" pitchFamily="18" charset="0"/>
-                            <a:cs typeface="Cambria Math" panose="02040503050406030204" pitchFamily="18" charset="0"/>
-                          </a:rPr>
-                          <m:t>𝑥</m:t>
-                        </m:r>
-                        <m:r>
-                          <a:rPr lang="en-US" altLang="zh-CN" sz="2000" i="1">
-                            <a:latin typeface="Cambria Math" panose="02040503050406030204" pitchFamily="18" charset="0"/>
-                            <a:cs typeface="Cambria Math" panose="02040503050406030204" pitchFamily="18" charset="0"/>
-                          </a:rPr>
-                          <m:t>, </m:t>
-                        </m:r>
-                        <m:r>
-                          <a:rPr lang="en-US" altLang="zh-CN" sz="2000" i="1">
-                            <a:latin typeface="Cambria Math" panose="02040503050406030204" pitchFamily="18" charset="0"/>
-                            <a:cs typeface="Cambria Math" panose="02040503050406030204" pitchFamily="18" charset="0"/>
-                          </a:rPr>
-                          <m:t>𝑡</m:t>
-                        </m:r>
-                        <m:sSup>
-                          <m:sSupPr>
-                            <m:ctrlPr>
-                              <a:rPr lang="en-US" altLang="zh-CN" sz="2000" i="1">
-                                <a:latin typeface="Cambria Math" panose="02040503050406030204" pitchFamily="18" charset="0"/>
-                                <a:cs typeface="Cambria Math" panose="02040503050406030204" pitchFamily="18" charset="0"/>
-                              </a:rPr>
-                            </m:ctrlPr>
-                          </m:sSupPr>
-                          <m:e>
-                            <m:r>
-                              <a:rPr lang="en-US" altLang="zh-CN" sz="2000" i="1">
-                                <a:latin typeface="Cambria Math" panose="02040503050406030204" pitchFamily="18" charset="0"/>
-                                <a:cs typeface="Cambria Math" panose="02040503050406030204" pitchFamily="18" charset="0"/>
-                              </a:rPr>
-                              <m:t>)</m:t>
-                            </m:r>
-                          </m:e>
-                          <m:sup>
-                            <m:r>
-                              <a:rPr lang="en-US" altLang="zh-CN" sz="2000" i="1">
-                                <a:latin typeface="Cambria Math" panose="02040503050406030204" pitchFamily="18" charset="0"/>
-                                <a:cs typeface="Cambria Math" panose="02040503050406030204" pitchFamily="18" charset="0"/>
-                              </a:rPr>
-                              <m:t>2</m:t>
-                            </m:r>
-                          </m:sup>
-                        </m:sSup>
-                      </m:num>
-                      <m:den>
-                        <m:r>
-                          <a:rPr lang="en-US" altLang="zh-CN" sz="2000" i="1">
-                            <a:latin typeface="Cambria Math" panose="02040503050406030204" pitchFamily="18" charset="0"/>
-                            <a:cs typeface="Cambria Math" panose="02040503050406030204" pitchFamily="18" charset="0"/>
-                          </a:rPr>
-                          <m:t>1</m:t>
-                        </m:r>
-                        <m:r>
-                          <a:rPr lang="en-US" altLang="zh-CN" sz="2000" i="1">
-                            <a:latin typeface="Cambria Math" panose="02040503050406030204" pitchFamily="18" charset="0"/>
-                            <a:cs typeface="Cambria Math" panose="02040503050406030204" pitchFamily="18" charset="0"/>
-                          </a:rPr>
-                          <m:t>+</m:t>
-                        </m:r>
-                        <m:r>
-                          <a:rPr lang="en-US" altLang="zh-CN" sz="2000" i="1">
-                            <a:latin typeface="Cambria Math" panose="02040503050406030204" pitchFamily="18" charset="0"/>
-                            <a:cs typeface="Cambria Math" panose="02040503050406030204" pitchFamily="18" charset="0"/>
-                          </a:rPr>
-                          <m:t>𝑘</m:t>
-                        </m:r>
-                        <m:r>
-                          <a:rPr lang="en-US" altLang="zh-CN" sz="2000" i="1">
-                            <a:latin typeface="Cambria Math" panose="02040503050406030204" pitchFamily="18" charset="0"/>
-                            <a:cs typeface="Cambria Math" panose="02040503050406030204" pitchFamily="18" charset="0"/>
-                          </a:rPr>
-                          <m:t>𝜌</m:t>
-                        </m:r>
-                        <m:nary>
-                          <m:naryPr>
-                            <m:limLoc m:val="undOvr"/>
-                            <m:subHide m:val="on"/>
-                            <m:supHide m:val="on"/>
-                            <m:ctrlPr>
-                              <a:rPr lang="en-US" altLang="zh-CN" sz="2000" i="1">
-                                <a:latin typeface="Cambria Math" panose="02040503050406030204" pitchFamily="18" charset="0"/>
-                                <a:cs typeface="Cambria Math" panose="02040503050406030204" pitchFamily="18" charset="0"/>
-                              </a:rPr>
-                            </m:ctrlPr>
-                          </m:naryPr>
-                          <m:sub/>
-                          <m:sup/>
-                          <m:e>
-                            <m:r>
-                              <a:rPr lang="en-US" altLang="zh-CN" sz="2000" i="1">
-                                <a:latin typeface="Cambria Math" panose="02040503050406030204" pitchFamily="18" charset="0"/>
-                                <a:cs typeface="Cambria Math" panose="02040503050406030204" pitchFamily="18" charset="0"/>
-                              </a:rPr>
-                              <m:t>𝑑𝑥</m:t>
-                            </m:r>
-                            <m:r>
-                              <a:rPr lang="en-US" altLang="zh-CN" sz="2000" i="1">
-                                <a:latin typeface="Cambria Math" panose="02040503050406030204" pitchFamily="18" charset="0"/>
-                                <a:cs typeface="Cambria Math" panose="02040503050406030204" pitchFamily="18" charset="0"/>
-                              </a:rPr>
-                              <m:t>'</m:t>
-                            </m:r>
-                            <m:r>
-                              <a:rPr lang="en-US" altLang="zh-CN" sz="2000" i="1">
-                                <a:latin typeface="Cambria Math" panose="02040503050406030204" pitchFamily="18" charset="0"/>
-                                <a:cs typeface="Cambria Math" panose="02040503050406030204" pitchFamily="18" charset="0"/>
-                              </a:rPr>
-                              <m:t>𝑢</m:t>
-                            </m:r>
-                            <m:r>
-                              <a:rPr lang="en-US" altLang="zh-CN" sz="2000" i="1">
-                                <a:latin typeface="Cambria Math" panose="02040503050406030204" pitchFamily="18" charset="0"/>
-                                <a:cs typeface="Cambria Math" panose="02040503050406030204" pitchFamily="18" charset="0"/>
-                              </a:rPr>
-                              <m:t>(</m:t>
-                            </m:r>
-                            <m:r>
-                              <a:rPr lang="en-US" altLang="zh-CN" sz="2000" i="1">
-                                <a:latin typeface="Cambria Math" panose="02040503050406030204" pitchFamily="18" charset="0"/>
-                                <a:cs typeface="Cambria Math" panose="02040503050406030204" pitchFamily="18" charset="0"/>
-                              </a:rPr>
-                              <m:t>𝑥</m:t>
-                            </m:r>
-                            <m:r>
-                              <a:rPr lang="en-US" altLang="zh-CN" sz="2000" i="1">
-                                <a:latin typeface="Cambria Math" panose="02040503050406030204" pitchFamily="18" charset="0"/>
-                                <a:cs typeface="Cambria Math" panose="02040503050406030204" pitchFamily="18" charset="0"/>
-                              </a:rPr>
-                              <m:t>', </m:t>
-                            </m:r>
-                            <m:r>
-                              <a:rPr lang="en-US" altLang="zh-CN" sz="2000" i="1">
-                                <a:latin typeface="Cambria Math" panose="02040503050406030204" pitchFamily="18" charset="0"/>
-                                <a:cs typeface="Cambria Math" panose="02040503050406030204" pitchFamily="18" charset="0"/>
-                              </a:rPr>
-                              <m:t>𝑡</m:t>
-                            </m:r>
-                            <m:sSup>
-                              <m:sSupPr>
-                                <m:ctrlPr>
-                                  <a:rPr lang="en-US" altLang="zh-CN" sz="2000" i="1">
-                                    <a:latin typeface="Cambria Math" panose="02040503050406030204" pitchFamily="18" charset="0"/>
-                                    <a:cs typeface="Cambria Math" panose="02040503050406030204" pitchFamily="18" charset="0"/>
-                                  </a:rPr>
-                                </m:ctrlPr>
-                              </m:sSupPr>
-                              <m:e>
-                                <m:r>
-                                  <a:rPr lang="en-US" altLang="zh-CN" sz="2000" i="1">
-                                    <a:latin typeface="Cambria Math" panose="02040503050406030204" pitchFamily="18" charset="0"/>
-                                    <a:cs typeface="Cambria Math" panose="02040503050406030204" pitchFamily="18" charset="0"/>
-                                  </a:rPr>
-                                  <m:t>)</m:t>
-                                </m:r>
-                              </m:e>
-                              <m:sup>
-                                <m:r>
-                                  <a:rPr lang="en-US" altLang="zh-CN" sz="2000" i="1">
-                                    <a:latin typeface="Cambria Math" panose="02040503050406030204" pitchFamily="18" charset="0"/>
-                                    <a:cs typeface="Cambria Math" panose="02040503050406030204" pitchFamily="18" charset="0"/>
-                                  </a:rPr>
-                                  <m:t>2</m:t>
-                                </m:r>
-                              </m:sup>
-                            </m:sSup>
-                          </m:e>
-                        </m:nary>
-                      </m:den>
-                    </m:f>
-                  </m:oMath>
-                </a14:m>
-                <a:endParaRPr lang="en-US" altLang="zh-CN" sz="2000" i="1">
-                  <a:latin typeface="Cambria Math" panose="02040503050406030204" pitchFamily="18" charset="0"/>
-                  <a:cs typeface="Cambria Math" panose="02040503050406030204" pitchFamily="18" charset="0"/>
-                </a:endParaRPr>
-              </a:p>
-            </p:txBody>
-          </p:sp>
-        </mc:Choice>
-        <mc:Fallback>
-          <p:sp>
-            <p:nvSpPr>
-              <p:cNvPr id="11" name="文本框 10"/>
-              <p:cNvSpPr txBox="1">
-                <a:spLocks noRot="1" noChangeAspect="1" noMove="1" noResize="1" noEditPoints="1" noAdjustHandles="1" noChangeArrowheads="1" noChangeShapeType="1" noTextEdit="1"/>
-              </p:cNvSpPr>
-              <p:nvPr/>
-            </p:nvSpPr>
-            <p:spPr>
-              <a:xfrm>
-                <a:off x="6088250" y="4045775"/>
-                <a:ext cx="2655570" cy="613410"/>
-              </a:xfrm>
-              <a:prstGeom prst="rect">
-                <a:avLst/>
-              </a:prstGeom>
-              <a:blipFill rotWithShape="1">
-                <a:blip r:embed="rId5"/>
-                <a:stretch>
-                  <a:fillRect l="-19" t="-31" r="19" b="31"/>
-                </a:stretch>
-              </a:blipFill>
-            </p:spPr>
-            <p:txBody>
-              <a:bodyPr/>
-              <a:lstStyle/>
-              <a:p>
-                <a:r>
-                  <a:rPr lang="zh-CN" altLang="en-US">
-                    <a:noFill/>
-                  </a:rPr>
-                  <a:t> </a:t>
-                </a:r>
-              </a:p>
-            </p:txBody>
-          </p:sp>
-        </mc:Fallback>
-      </mc:AlternateContent>
       <p:sp>
         <p:nvSpPr>
           <p:cNvPr id="13" name="右大括号 12"/>
@@ -7338,7 +7163,7 @@
         </p:nvSpPr>
         <p:spPr>
           <a:xfrm>
-            <a:off x="5832000" y="4968000"/>
+            <a:off x="5748180" y="4968000"/>
             <a:ext cx="216000" cy="504000"/>
           </a:xfrm>
           <a:prstGeom prst="rightBrace">
@@ -7377,8 +7202,8 @@
             </p:nvSpPr>
             <p:spPr>
               <a:xfrm>
-                <a:off x="6167625" y="4854130"/>
-                <a:ext cx="5550535" cy="669925"/>
+                <a:off x="6083935" y="4853940"/>
+                <a:ext cx="6828790" cy="669925"/>
               </a:xfrm>
               <a:prstGeom prst="rect">
                 <a:avLst/>
@@ -7386,7 +7211,7 @@
               <a:noFill/>
             </p:spPr>
             <p:txBody>
-              <a:bodyPr wrap="none" rtlCol="0" anchor="t">
+              <a:bodyPr wrap="square" rtlCol="0" anchor="t">
                 <a:spAutoFit/>
               </a:bodyPr>
               <a:p>
@@ -7394,7 +7219,7 @@
                 <a14:m>
                   <m:oMathPara xmlns:m="http://schemas.openxmlformats.org/officeDocument/2006/math">
                     <m:oMathParaPr>
-                      <m:jc m:val="centerGroup"/>
+                      <m:jc m:val="left"/>
                     </m:oMathParaPr>
                     <m:oMath xmlns:m="http://schemas.openxmlformats.org/officeDocument/2006/math">
                       <m:f>
@@ -7688,16 +7513,16 @@
             </p:nvSpPr>
             <p:spPr>
               <a:xfrm>
-                <a:off x="6167625" y="4854130"/>
-                <a:ext cx="5550535" cy="669925"/>
+                <a:off x="6083935" y="4853940"/>
+                <a:ext cx="6828790" cy="669925"/>
               </a:xfrm>
               <a:prstGeom prst="rect">
                 <a:avLst/>
               </a:prstGeom>
               <a:blipFill rotWithShape="1">
-                <a:blip r:embed="rId6"/>
+                <a:blip r:embed="rId5"/>
                 <a:stretch>
-                  <a:fillRect l="-9" t="-28" r="9" b="28"/>
+                  <a:fillRect/>
                 </a:stretch>
               </a:blipFill>
             </p:spPr>
@@ -7724,7 +7549,7 @@
         </p:nvSpPr>
         <p:spPr>
           <a:xfrm>
-            <a:off x="10113645" y="11045825"/>
+            <a:off x="9374505" y="11102340"/>
             <a:ext cx="216000" cy="648000"/>
           </a:xfrm>
           <a:prstGeom prst="rightBrace">
@@ -7763,8 +7588,8 @@
             </p:nvSpPr>
             <p:spPr>
               <a:xfrm>
-                <a:off x="10481881" y="11024806"/>
-                <a:ext cx="2771140" cy="658495"/>
+                <a:off x="9742805" y="11025505"/>
+                <a:ext cx="3766185" cy="723265"/>
               </a:xfrm>
               <a:prstGeom prst="rect">
                 <a:avLst/>
@@ -7772,7 +7597,7 @@
               <a:noFill/>
             </p:spPr>
             <p:txBody>
-              <a:bodyPr wrap="none" rtlCol="0" anchor="t">
+              <a:bodyPr wrap="square" rtlCol="0" anchor="t">
                 <a:spAutoFit/>
               </a:bodyPr>
               <a:p>
@@ -7780,13 +7605,13 @@
                 <a14:m>
                   <m:oMathPara xmlns:m="http://schemas.openxmlformats.org/officeDocument/2006/math">
                     <m:oMathParaPr>
-                      <m:jc m:val="centerGroup"/>
+                      <m:jc m:val="left"/>
                     </m:oMathParaPr>
                     <m:oMath xmlns:m="http://schemas.openxmlformats.org/officeDocument/2006/math">
                       <m:sSub>
                         <m:sSubPr>
                           <m:ctrlPr>
-                            <a:rPr lang="en-US" altLang="zh-CN" i="1">
+                            <a:rPr lang="en-US" altLang="zh-CN" sz="2000" i="1">
                               <a:latin typeface="Cambria Math" panose="02040503050406030204" pitchFamily="18" charset="0"/>
                               <a:cs typeface="Cambria Math" panose="02040503050406030204" pitchFamily="18" charset="0"/>
                             </a:rPr>
@@ -7794,7 +7619,7 @@
                         </m:sSubPr>
                         <m:e>
                           <m:r>
-                            <a:rPr lang="en-US" altLang="zh-CN" i="1">
+                            <a:rPr lang="en-US" altLang="zh-CN" sz="2000" i="1">
                               <a:latin typeface="Cambria Math" panose="02040503050406030204" pitchFamily="18" charset="0"/>
                               <a:cs typeface="Cambria Math" panose="02040503050406030204" pitchFamily="18" charset="0"/>
                             </a:rPr>
@@ -7803,7 +7628,7 @@
                         </m:e>
                         <m:sub>
                           <m:r>
-                            <a:rPr lang="en-US" altLang="zh-CN" i="1">
+                            <a:rPr lang="en-US" altLang="zh-CN" sz="2000" i="1">
                               <a:latin typeface="Cambria Math" panose="02040503050406030204" pitchFamily="18" charset="0"/>
                               <a:cs typeface="Cambria Math" panose="02040503050406030204" pitchFamily="18" charset="0"/>
                             </a:rPr>
@@ -7812,35 +7637,35 @@
                         </m:sub>
                       </m:sSub>
                       <m:r>
-                        <a:rPr lang="en-US" altLang="zh-CN" i="1">
+                        <a:rPr lang="en-US" altLang="zh-CN" sz="2000" i="1">
                           <a:latin typeface="Cambria Math" panose="02040503050406030204" pitchFamily="18" charset="0"/>
                           <a:cs typeface="Cambria Math" panose="02040503050406030204" pitchFamily="18" charset="0"/>
                         </a:rPr>
                         <m:t>=</m:t>
                       </m:r>
                       <m:r>
-                        <a:rPr lang="en-US" altLang="zh-CN" i="1">
+                        <a:rPr lang="en-US" altLang="zh-CN" sz="2000" i="1">
                           <a:latin typeface="Cambria Math" panose="02040503050406030204" pitchFamily="18" charset="0"/>
                           <a:cs typeface="Cambria Math" panose="02040503050406030204" pitchFamily="18" charset="0"/>
                         </a:rPr>
                         <m:t>𝐴</m:t>
                       </m:r>
                       <m:r>
-                        <a:rPr lang="en-US" altLang="zh-CN" i="1">
+                        <a:rPr lang="en-US" altLang="zh-CN" sz="2000" i="1">
                           <a:latin typeface="Cambria Math" panose="02040503050406030204" pitchFamily="18" charset="0"/>
                           <a:cs typeface="Cambria Math" panose="02040503050406030204" pitchFamily="18" charset="0"/>
                         </a:rPr>
                         <m:t> </m:t>
                       </m:r>
                       <m:r>
-                        <a:rPr lang="en-US" altLang="zh-CN" i="1">
+                        <a:rPr lang="en-US" altLang="zh-CN" sz="2000" i="1">
                           <a:latin typeface="Cambria Math" panose="02040503050406030204" pitchFamily="18" charset="0"/>
                           <a:cs typeface="Cambria Math" panose="02040503050406030204" pitchFamily="18" charset="0"/>
                         </a:rPr>
                         <m:t>𝑒𝑥𝑝</m:t>
                       </m:r>
                       <m:r>
-                        <a:rPr lang="en-US" altLang="zh-CN" i="1">
+                        <a:rPr lang="en-US" altLang="zh-CN" sz="2000" i="1">
                           <a:latin typeface="Cambria Math" panose="02040503050406030204" pitchFamily="18" charset="0"/>
                           <a:cs typeface="Cambria Math" panose="02040503050406030204" pitchFamily="18" charset="0"/>
                         </a:rPr>
@@ -7849,7 +7674,7 @@
                       <m:f>
                         <m:fPr>
                           <m:ctrlPr>
-                            <a:rPr lang="en-US" altLang="zh-CN" i="1">
+                            <a:rPr lang="en-US" altLang="zh-CN" sz="2000" i="1">
                               <a:latin typeface="Cambria Math" panose="02040503050406030204" pitchFamily="18" charset="0"/>
                               <a:cs typeface="Cambria Math" panose="02040503050406030204" pitchFamily="18" charset="0"/>
                             </a:rPr>
@@ -7857,49 +7682,49 @@
                         </m:fPr>
                         <m:num>
                           <m:r>
-                            <a:rPr lang="en-US" altLang="zh-CN" i="1">
+                            <a:rPr lang="en-US" altLang="zh-CN" sz="2000" i="1">
                               <a:latin typeface="Cambria Math" panose="02040503050406030204" pitchFamily="18" charset="0"/>
                               <a:cs typeface="Cambria Math" panose="02040503050406030204" pitchFamily="18" charset="0"/>
                             </a:rPr>
                             <m:t>|</m:t>
                           </m:r>
                           <m:r>
-                            <a:rPr lang="en-US" altLang="zh-CN" i="1">
+                            <a:rPr lang="en-US" altLang="zh-CN" sz="2000" i="1">
                               <a:latin typeface="Cambria Math" panose="02040503050406030204" pitchFamily="18" charset="0"/>
                               <a:cs typeface="Cambria Math" panose="02040503050406030204" pitchFamily="18" charset="0"/>
                             </a:rPr>
                             <m:t>𝑥</m:t>
                           </m:r>
                           <m:r>
-                            <a:rPr lang="en-US" altLang="zh-CN" i="1">
+                            <a:rPr lang="en-US" altLang="zh-CN" sz="2000" i="1">
                               <a:latin typeface="Cambria Math" panose="02040503050406030204" pitchFamily="18" charset="0"/>
                               <a:cs typeface="Cambria Math" panose="02040503050406030204" pitchFamily="18" charset="0"/>
                             </a:rPr>
                             <m:t>−</m:t>
                           </m:r>
                           <m:r>
-                            <a:rPr lang="en-US" altLang="zh-CN" i="1">
+                            <a:rPr lang="en-US" altLang="zh-CN" sz="2000" i="1">
                               <a:latin typeface="Cambria Math" panose="02040503050406030204" pitchFamily="18" charset="0"/>
                               <a:cs typeface="Cambria Math" panose="02040503050406030204" pitchFamily="18" charset="0"/>
                             </a:rPr>
                             <m:t>𝑧</m:t>
                           </m:r>
                           <m:r>
-                            <a:rPr lang="en-US" altLang="zh-CN" i="1">
+                            <a:rPr lang="en-US" altLang="zh-CN" sz="2000" i="1">
                               <a:latin typeface="Cambria Math" panose="02040503050406030204" pitchFamily="18" charset="0"/>
                               <a:cs typeface="Cambria Math" panose="02040503050406030204" pitchFamily="18" charset="0"/>
                             </a:rPr>
                             <m:t>(</m:t>
                           </m:r>
                           <m:r>
-                            <a:rPr lang="en-US" altLang="zh-CN" i="1">
+                            <a:rPr lang="en-US" altLang="zh-CN" sz="2000" i="1">
                               <a:latin typeface="Cambria Math" panose="02040503050406030204" pitchFamily="18" charset="0"/>
                               <a:cs typeface="Cambria Math" panose="02040503050406030204" pitchFamily="18" charset="0"/>
                             </a:rPr>
                             <m:t>𝑡</m:t>
                           </m:r>
                           <m:r>
-                            <a:rPr lang="en-US" altLang="zh-CN" i="1">
+                            <a:rPr lang="en-US" altLang="zh-CN" sz="2000" i="1">
                               <a:latin typeface="Cambria Math" panose="02040503050406030204" pitchFamily="18" charset="0"/>
                               <a:cs typeface="Cambria Math" panose="02040503050406030204" pitchFamily="18" charset="0"/>
                             </a:rPr>
@@ -7908,7 +7733,7 @@
                           <m:sSup>
                             <m:sSupPr>
                               <m:ctrlPr>
-                                <a:rPr lang="en-US" altLang="zh-CN" i="1">
+                                <a:rPr lang="en-US" altLang="zh-CN" sz="2000" i="1">
                                   <a:latin typeface="Cambria Math" panose="02040503050406030204" pitchFamily="18" charset="0"/>
                                   <a:cs typeface="Cambria Math" panose="02040503050406030204" pitchFamily="18" charset="0"/>
                                 </a:rPr>
@@ -7916,7 +7741,7 @@
                             </m:sSupPr>
                             <m:e>
                               <m:r>
-                                <a:rPr lang="en-US" altLang="zh-CN" i="1">
+                                <a:rPr lang="en-US" altLang="zh-CN" sz="2000" i="1">
                                   <a:latin typeface="Cambria Math" panose="02040503050406030204" pitchFamily="18" charset="0"/>
                                   <a:cs typeface="Cambria Math" panose="02040503050406030204" pitchFamily="18" charset="0"/>
                                 </a:rPr>
@@ -7925,7 +7750,7 @@
                             </m:e>
                             <m:sup>
                               <m:r>
-                                <a:rPr lang="en-US" altLang="zh-CN" i="1">
+                                <a:rPr lang="en-US" altLang="zh-CN" sz="2000" i="1">
                                   <a:latin typeface="Cambria Math" panose="02040503050406030204" pitchFamily="18" charset="0"/>
                                   <a:cs typeface="Cambria Math" panose="02040503050406030204" pitchFamily="18" charset="0"/>
                                 </a:rPr>
@@ -7934,7 +7759,7 @@
                             </m:sup>
                           </m:sSup>
                           <m:r>
-                            <a:rPr lang="en-US" altLang="zh-CN" i="1">
+                            <a:rPr lang="en-US" altLang="zh-CN" sz="2000" i="1">
                               <a:latin typeface="Cambria Math" panose="02040503050406030204" pitchFamily="18" charset="0"/>
                               <a:cs typeface="Cambria Math" panose="02040503050406030204" pitchFamily="18" charset="0"/>
                             </a:rPr>
@@ -7943,7 +7768,7 @@
                         </m:num>
                         <m:den>
                           <m:r>
-                            <a:rPr lang="en-US" altLang="zh-CN" i="1">
+                            <a:rPr lang="en-US" altLang="zh-CN" sz="2000" i="1">
                               <a:latin typeface="Cambria Math" panose="02040503050406030204" pitchFamily="18" charset="0"/>
                               <a:cs typeface="Cambria Math" panose="02040503050406030204" pitchFamily="18" charset="0"/>
                             </a:rPr>
@@ -7952,7 +7777,7 @@
                           <m:sSup>
                             <m:sSupPr>
                               <m:ctrlPr>
-                                <a:rPr lang="en-US" altLang="zh-CN" i="1">
+                                <a:rPr lang="en-US" altLang="zh-CN" sz="2000" i="1">
                                   <a:latin typeface="Cambria Math" panose="02040503050406030204" pitchFamily="18" charset="0"/>
                                   <a:cs typeface="Cambria Math" panose="02040503050406030204" pitchFamily="18" charset="0"/>
                                 </a:rPr>
@@ -7960,7 +7785,7 @@
                             </m:sSupPr>
                             <m:e>
                               <m:r>
-                                <a:rPr lang="en-US" altLang="zh-CN" i="1">
+                                <a:rPr lang="en-US" altLang="zh-CN" sz="2000" i="1">
                                   <a:latin typeface="Cambria Math" panose="02040503050406030204" pitchFamily="18" charset="0"/>
                                   <a:cs typeface="Cambria Math" panose="02040503050406030204" pitchFamily="18" charset="0"/>
                                 </a:rPr>
@@ -7969,7 +7794,7 @@
                             </m:e>
                             <m:sup>
                               <m:r>
-                                <a:rPr lang="en-US" altLang="zh-CN" i="1">
+                                <a:rPr lang="en-US" altLang="zh-CN" sz="2000" i="1">
                                   <a:latin typeface="Cambria Math" panose="02040503050406030204" pitchFamily="18" charset="0"/>
                                   <a:cs typeface="Cambria Math" panose="02040503050406030204" pitchFamily="18" charset="0"/>
                                 </a:rPr>
@@ -7980,8 +7805,9 @@
                         </m:den>
                       </m:f>
                       <m:r>
-                        <a:rPr lang="en-US" altLang="zh-CN" i="1">
+                        <a:rPr lang="en-US" altLang="zh-CN" sz="2000" i="1">
                           <a:latin typeface="Cambria Math" panose="02040503050406030204" pitchFamily="18" charset="0"/>
+                          <a:ea typeface="宋体" charset="0"/>
                           <a:cs typeface="Cambria Math" panose="02040503050406030204" pitchFamily="18" charset="0"/>
                         </a:rPr>
                         <m:t>)</m:t>
@@ -7989,7 +7815,10 @@
                     </m:oMath>
                   </m:oMathPara>
                 </a14:m>
-                <a:endParaRPr lang="zh-CN" altLang="en-US"/>
+                <a:endParaRPr lang="en-US" altLang="zh-CN" sz="2000" i="1">
+                  <a:latin typeface="Cambria Math" panose="02040503050406030204" pitchFamily="18" charset="0"/>
+                  <a:cs typeface="Cambria Math" panose="02040503050406030204" pitchFamily="18" charset="0"/>
+                </a:endParaRPr>
               </a:p>
             </p:txBody>
           </p:sp>
@@ -8005,16 +7834,16 @@
             </p:nvSpPr>
             <p:spPr>
               <a:xfrm>
-                <a:off x="10481881" y="11024806"/>
-                <a:ext cx="2771140" cy="658495"/>
+                <a:off x="9742805" y="11025505"/>
+                <a:ext cx="3766185" cy="723265"/>
               </a:xfrm>
               <a:prstGeom prst="rect">
                 <a:avLst/>
               </a:prstGeom>
               <a:blipFill rotWithShape="1">
-                <a:blip r:embed="rId7"/>
+                <a:blip r:embed="rId6"/>
                 <a:stretch>
-                  <a:fillRect l="-21" t="-87" r="21" b="87"/>
+                  <a:fillRect/>
                 </a:stretch>
               </a:blipFill>
             </p:spPr>
@@ -8033,6 +7862,39 @@
           </p:sp>
         </mc:Fallback>
       </mc:AlternateContent>
+      <p:cxnSp>
+        <p:nvCxnSpPr>
+          <p:cNvPr id="19" name="直接箭头连接符 18"/>
+          <p:cNvCxnSpPr/>
+          <p:nvPr/>
+        </p:nvCxnSpPr>
+        <p:spPr>
+          <a:xfrm>
+            <a:off x="11339195" y="8847328"/>
+            <a:ext cx="648000" cy="0"/>
+          </a:xfrm>
+          <a:prstGeom prst="straightConnector1">
+            <a:avLst/>
+          </a:prstGeom>
+          <a:ln>
+            <a:tailEnd type="triangle"/>
+          </a:ln>
+        </p:spPr>
+        <p:style>
+          <a:lnRef idx="1">
+            <a:schemeClr val="dk1"/>
+          </a:lnRef>
+          <a:fillRef idx="0">
+            <a:schemeClr val="dk1"/>
+          </a:fillRef>
+          <a:effectRef idx="0">
+            <a:schemeClr val="dk1"/>
+          </a:effectRef>
+          <a:fontRef idx="minor">
+            <a:schemeClr val="tx1"/>
+          </a:fontRef>
+        </p:style>
+      </p:cxnSp>
     </p:spTree>
   </p:cSld>
   <p:clrMapOvr>

</xml_diff>